<commit_message>
End of class changes
</commit_message>
<xml_diff>
--- a/Project_One_BTTV.pptx
+++ b/Project_One_BTTV.pptx
@@ -4,6 +4,9 @@
   <p:sldMasterIdLst>
     <p:sldMasterId id="2147484440" r:id="rId1"/>
   </p:sldMasterIdLst>
+  <p:notesMasterIdLst>
+    <p:notesMasterId r:id="rId16"/>
+  </p:notesMasterIdLst>
   <p:sldIdLst>
     <p:sldId id="256" r:id="rId2"/>
     <p:sldId id="257" r:id="rId3"/>
@@ -125,65 +128,437 @@
 </p:presentation>
 </file>
 
-<file path=ppt/revisionInfo.xml><?xml version="1.0" encoding="utf-8"?>
-<p1510:revInfo xmlns:a="http://schemas.openxmlformats.org/drawingml/2006/main" xmlns:r="http://schemas.openxmlformats.org/officeDocument/2006/relationships" xmlns:p1510="http://schemas.microsoft.com/office/powerpoint/2015/10/main">
-  <p1510:revLst>
-    <p1510:client id="{0DC329F3-2624-4B5B-8F68-7D33A36141B8}" v="3" dt="2020-07-29T03:37:51.552"/>
-  </p1510:revLst>
-</p1510:revInfo>
+<file path=ppt/notesMasters/notesMaster1.xml><?xml version="1.0" encoding="utf-8"?>
+<p:notesMaster xmlns:a="http://schemas.openxmlformats.org/drawingml/2006/main" xmlns:r="http://schemas.openxmlformats.org/officeDocument/2006/relationships" xmlns:p="http://schemas.openxmlformats.org/presentationml/2006/main">
+  <p:cSld>
+    <p:bg>
+      <p:bgRef idx="1001">
+        <a:schemeClr val="bg1"/>
+      </p:bgRef>
+    </p:bg>
+    <p:spTree>
+      <p:nvGrpSpPr>
+        <p:cNvPr id="1" name=""/>
+        <p:cNvGrpSpPr/>
+        <p:nvPr/>
+      </p:nvGrpSpPr>
+      <p:grpSpPr>
+        <a:xfrm>
+          <a:off x="0" y="0"/>
+          <a:ext cx="0" cy="0"/>
+          <a:chOff x="0" y="0"/>
+          <a:chExt cx="0" cy="0"/>
+        </a:xfrm>
+      </p:grpSpPr>
+      <p:sp>
+        <p:nvSpPr>
+          <p:cNvPr id="2" name="Header Placeholder 1"/>
+          <p:cNvSpPr>
+            <a:spLocks noGrp="1"/>
+          </p:cNvSpPr>
+          <p:nvPr>
+            <p:ph type="hdr" sz="quarter"/>
+          </p:nvPr>
+        </p:nvSpPr>
+        <p:spPr>
+          <a:xfrm>
+            <a:off x="0" y="0"/>
+            <a:ext cx="2971800" cy="458788"/>
+          </a:xfrm>
+          <a:prstGeom prst="rect">
+            <a:avLst/>
+          </a:prstGeom>
+        </p:spPr>
+        <p:txBody>
+          <a:bodyPr vert="horz" lIns="91440" tIns="45720" rIns="91440" bIns="45720" rtlCol="0"/>
+          <a:lstStyle>
+            <a:lvl1pPr algn="l">
+              <a:defRPr sz="1200"/>
+            </a:lvl1pPr>
+          </a:lstStyle>
+          <a:p>
+            <a:endParaRPr lang="en-US"/>
+          </a:p>
+        </p:txBody>
+      </p:sp>
+      <p:sp>
+        <p:nvSpPr>
+          <p:cNvPr id="3" name="Date Placeholder 2"/>
+          <p:cNvSpPr>
+            <a:spLocks noGrp="1"/>
+          </p:cNvSpPr>
+          <p:nvPr>
+            <p:ph type="dt" idx="1"/>
+          </p:nvPr>
+        </p:nvSpPr>
+        <p:spPr>
+          <a:xfrm>
+            <a:off x="3884613" y="0"/>
+            <a:ext cx="2971800" cy="458788"/>
+          </a:xfrm>
+          <a:prstGeom prst="rect">
+            <a:avLst/>
+          </a:prstGeom>
+        </p:spPr>
+        <p:txBody>
+          <a:bodyPr vert="horz" lIns="91440" tIns="45720" rIns="91440" bIns="45720" rtlCol="0"/>
+          <a:lstStyle>
+            <a:lvl1pPr algn="r">
+              <a:defRPr sz="1200"/>
+            </a:lvl1pPr>
+          </a:lstStyle>
+          <a:p>
+            <a:fld id="{CDA160FB-BC7D-614F-8FEF-B8325232A817}" type="datetimeFigureOut">
+              <a:rPr lang="en-US" smtClean="0"/>
+              <a:t>7/28/20</a:t>
+            </a:fld>
+            <a:endParaRPr lang="en-US"/>
+          </a:p>
+        </p:txBody>
+      </p:sp>
+      <p:sp>
+        <p:nvSpPr>
+          <p:cNvPr id="4" name="Slide Image Placeholder 3"/>
+          <p:cNvSpPr>
+            <a:spLocks noGrp="1" noRot="1" noChangeAspect="1"/>
+          </p:cNvSpPr>
+          <p:nvPr>
+            <p:ph type="sldImg" idx="2"/>
+          </p:nvPr>
+        </p:nvSpPr>
+        <p:spPr>
+          <a:xfrm>
+            <a:off x="685800" y="1143000"/>
+            <a:ext cx="5486400" cy="3086100"/>
+          </a:xfrm>
+          <a:prstGeom prst="rect">
+            <a:avLst/>
+          </a:prstGeom>
+          <a:noFill/>
+          <a:ln w="12700">
+            <a:solidFill>
+              <a:prstClr val="black"/>
+            </a:solidFill>
+          </a:ln>
+        </p:spPr>
+        <p:txBody>
+          <a:bodyPr vert="horz" lIns="91440" tIns="45720" rIns="91440" bIns="45720" rtlCol="0" anchor="ctr"/>
+          <a:lstStyle/>
+          <a:p>
+            <a:endParaRPr lang="en-US"/>
+          </a:p>
+        </p:txBody>
+      </p:sp>
+      <p:sp>
+        <p:nvSpPr>
+          <p:cNvPr id="5" name="Notes Placeholder 4"/>
+          <p:cNvSpPr>
+            <a:spLocks noGrp="1"/>
+          </p:cNvSpPr>
+          <p:nvPr>
+            <p:ph type="body" sz="quarter" idx="3"/>
+          </p:nvPr>
+        </p:nvSpPr>
+        <p:spPr>
+          <a:xfrm>
+            <a:off x="685800" y="4400550"/>
+            <a:ext cx="5486400" cy="3600450"/>
+          </a:xfrm>
+          <a:prstGeom prst="rect">
+            <a:avLst/>
+          </a:prstGeom>
+        </p:spPr>
+        <p:txBody>
+          <a:bodyPr vert="horz" lIns="91440" tIns="45720" rIns="91440" bIns="45720" rtlCol="0"/>
+          <a:lstStyle/>
+          <a:p>
+            <a:pPr lvl="0"/>
+            <a:r>
+              <a:rPr lang="en-US"/>
+              <a:t>Click to edit Master text styles</a:t>
+            </a:r>
+          </a:p>
+          <a:p>
+            <a:pPr lvl="1"/>
+            <a:r>
+              <a:rPr lang="en-US"/>
+              <a:t>Second level</a:t>
+            </a:r>
+          </a:p>
+          <a:p>
+            <a:pPr lvl="2"/>
+            <a:r>
+              <a:rPr lang="en-US"/>
+              <a:t>Third level</a:t>
+            </a:r>
+          </a:p>
+          <a:p>
+            <a:pPr lvl="3"/>
+            <a:r>
+              <a:rPr lang="en-US"/>
+              <a:t>Fourth level</a:t>
+            </a:r>
+          </a:p>
+          <a:p>
+            <a:pPr lvl="4"/>
+            <a:r>
+              <a:rPr lang="en-US"/>
+              <a:t>Fifth level</a:t>
+            </a:r>
+          </a:p>
+        </p:txBody>
+      </p:sp>
+      <p:sp>
+        <p:nvSpPr>
+          <p:cNvPr id="6" name="Footer Placeholder 5"/>
+          <p:cNvSpPr>
+            <a:spLocks noGrp="1"/>
+          </p:cNvSpPr>
+          <p:nvPr>
+            <p:ph type="ftr" sz="quarter" idx="4"/>
+          </p:nvPr>
+        </p:nvSpPr>
+        <p:spPr>
+          <a:xfrm>
+            <a:off x="0" y="8685213"/>
+            <a:ext cx="2971800" cy="458787"/>
+          </a:xfrm>
+          <a:prstGeom prst="rect">
+            <a:avLst/>
+          </a:prstGeom>
+        </p:spPr>
+        <p:txBody>
+          <a:bodyPr vert="horz" lIns="91440" tIns="45720" rIns="91440" bIns="45720" rtlCol="0" anchor="b"/>
+          <a:lstStyle>
+            <a:lvl1pPr algn="l">
+              <a:defRPr sz="1200"/>
+            </a:lvl1pPr>
+          </a:lstStyle>
+          <a:p>
+            <a:endParaRPr lang="en-US"/>
+          </a:p>
+        </p:txBody>
+      </p:sp>
+      <p:sp>
+        <p:nvSpPr>
+          <p:cNvPr id="7" name="Slide Number Placeholder 6"/>
+          <p:cNvSpPr>
+            <a:spLocks noGrp="1"/>
+          </p:cNvSpPr>
+          <p:nvPr>
+            <p:ph type="sldNum" sz="quarter" idx="5"/>
+          </p:nvPr>
+        </p:nvSpPr>
+        <p:spPr>
+          <a:xfrm>
+            <a:off x="3884613" y="8685213"/>
+            <a:ext cx="2971800" cy="458787"/>
+          </a:xfrm>
+          <a:prstGeom prst="rect">
+            <a:avLst/>
+          </a:prstGeom>
+        </p:spPr>
+        <p:txBody>
+          <a:bodyPr vert="horz" lIns="91440" tIns="45720" rIns="91440" bIns="45720" rtlCol="0" anchor="b"/>
+          <a:lstStyle>
+            <a:lvl1pPr algn="r">
+              <a:defRPr sz="1200"/>
+            </a:lvl1pPr>
+          </a:lstStyle>
+          <a:p>
+            <a:fld id="{734749DF-141D-8E4B-867F-726A84A5C9C7}" type="slidenum">
+              <a:rPr lang="en-US" smtClean="0"/>
+              <a:t>‹#›</a:t>
+            </a:fld>
+            <a:endParaRPr lang="en-US"/>
+          </a:p>
+        </p:txBody>
+      </p:sp>
+    </p:spTree>
+    <p:extLst>
+      <p:ext uri="{BB962C8B-B14F-4D97-AF65-F5344CB8AC3E}">
+        <p14:creationId xmlns:p14="http://schemas.microsoft.com/office/powerpoint/2010/main" val="2207888681"/>
+      </p:ext>
+    </p:extLst>
+  </p:cSld>
+  <p:clrMap bg1="lt1" tx1="dk1" bg2="lt2" tx2="dk2" accent1="accent1" accent2="accent2" accent3="accent3" accent4="accent4" accent5="accent5" accent6="accent6" hlink="hlink" folHlink="folHlink"/>
+  <p:notesStyle>
+    <a:lvl1pPr marL="0" algn="l" defTabSz="914400" rtl="0" eaLnBrk="1" latinLnBrk="0" hangingPunct="1">
+      <a:defRPr sz="1200" kern="1200">
+        <a:solidFill>
+          <a:schemeClr val="tx1"/>
+        </a:solidFill>
+        <a:latin typeface="+mn-lt"/>
+        <a:ea typeface="+mn-ea"/>
+        <a:cs typeface="+mn-cs"/>
+      </a:defRPr>
+    </a:lvl1pPr>
+    <a:lvl2pPr marL="457200" algn="l" defTabSz="914400" rtl="0" eaLnBrk="1" latinLnBrk="0" hangingPunct="1">
+      <a:defRPr sz="1200" kern="1200">
+        <a:solidFill>
+          <a:schemeClr val="tx1"/>
+        </a:solidFill>
+        <a:latin typeface="+mn-lt"/>
+        <a:ea typeface="+mn-ea"/>
+        <a:cs typeface="+mn-cs"/>
+      </a:defRPr>
+    </a:lvl2pPr>
+    <a:lvl3pPr marL="914400" algn="l" defTabSz="914400" rtl="0" eaLnBrk="1" latinLnBrk="0" hangingPunct="1">
+      <a:defRPr sz="1200" kern="1200">
+        <a:solidFill>
+          <a:schemeClr val="tx1"/>
+        </a:solidFill>
+        <a:latin typeface="+mn-lt"/>
+        <a:ea typeface="+mn-ea"/>
+        <a:cs typeface="+mn-cs"/>
+      </a:defRPr>
+    </a:lvl3pPr>
+    <a:lvl4pPr marL="1371600" algn="l" defTabSz="914400" rtl="0" eaLnBrk="1" latinLnBrk="0" hangingPunct="1">
+      <a:defRPr sz="1200" kern="1200">
+        <a:solidFill>
+          <a:schemeClr val="tx1"/>
+        </a:solidFill>
+        <a:latin typeface="+mn-lt"/>
+        <a:ea typeface="+mn-ea"/>
+        <a:cs typeface="+mn-cs"/>
+      </a:defRPr>
+    </a:lvl4pPr>
+    <a:lvl5pPr marL="1828800" algn="l" defTabSz="914400" rtl="0" eaLnBrk="1" latinLnBrk="0" hangingPunct="1">
+      <a:defRPr sz="1200" kern="1200">
+        <a:solidFill>
+          <a:schemeClr val="tx1"/>
+        </a:solidFill>
+        <a:latin typeface="+mn-lt"/>
+        <a:ea typeface="+mn-ea"/>
+        <a:cs typeface="+mn-cs"/>
+      </a:defRPr>
+    </a:lvl5pPr>
+    <a:lvl6pPr marL="2286000" algn="l" defTabSz="914400" rtl="0" eaLnBrk="1" latinLnBrk="0" hangingPunct="1">
+      <a:defRPr sz="1200" kern="1200">
+        <a:solidFill>
+          <a:schemeClr val="tx1"/>
+        </a:solidFill>
+        <a:latin typeface="+mn-lt"/>
+        <a:ea typeface="+mn-ea"/>
+        <a:cs typeface="+mn-cs"/>
+      </a:defRPr>
+    </a:lvl6pPr>
+    <a:lvl7pPr marL="2743200" algn="l" defTabSz="914400" rtl="0" eaLnBrk="1" latinLnBrk="0" hangingPunct="1">
+      <a:defRPr sz="1200" kern="1200">
+        <a:solidFill>
+          <a:schemeClr val="tx1"/>
+        </a:solidFill>
+        <a:latin typeface="+mn-lt"/>
+        <a:ea typeface="+mn-ea"/>
+        <a:cs typeface="+mn-cs"/>
+      </a:defRPr>
+    </a:lvl7pPr>
+    <a:lvl8pPr marL="3200400" algn="l" defTabSz="914400" rtl="0" eaLnBrk="1" latinLnBrk="0" hangingPunct="1">
+      <a:defRPr sz="1200" kern="1200">
+        <a:solidFill>
+          <a:schemeClr val="tx1"/>
+        </a:solidFill>
+        <a:latin typeface="+mn-lt"/>
+        <a:ea typeface="+mn-ea"/>
+        <a:cs typeface="+mn-cs"/>
+      </a:defRPr>
+    </a:lvl8pPr>
+    <a:lvl9pPr marL="3657600" algn="l" defTabSz="914400" rtl="0" eaLnBrk="1" latinLnBrk="0" hangingPunct="1">
+      <a:defRPr sz="1200" kern="1200">
+        <a:solidFill>
+          <a:schemeClr val="tx1"/>
+        </a:solidFill>
+        <a:latin typeface="+mn-lt"/>
+        <a:ea typeface="+mn-ea"/>
+        <a:cs typeface="+mn-cs"/>
+      </a:defRPr>
+    </a:lvl9pPr>
+  </p:notesStyle>
+</p:notesMaster>
 </file>
 
-<file path=ppt/changesInfos/changesInfo1.xml><?xml version="1.0" encoding="utf-8"?>
-<pc:chgInfo xmlns:a="http://schemas.openxmlformats.org/drawingml/2006/main" xmlns:r="http://schemas.openxmlformats.org/officeDocument/2006/relationships" xmlns:ac="http://schemas.microsoft.com/office/drawing/2013/main/command" xmlns:pc="http://schemas.microsoft.com/office/powerpoint/2013/main/command">
-  <pc:docChgLst>
-    <pc:chgData name="Trevor Towers" userId="189fe846af54169a" providerId="LiveId" clId="{0DC329F3-2624-4B5B-8F68-7D33A36141B8}"/>
-    <pc:docChg chg="custSel modSld">
-      <pc:chgData name="Trevor Towers" userId="189fe846af54169a" providerId="LiveId" clId="{0DC329F3-2624-4B5B-8F68-7D33A36141B8}" dt="2020-07-29T03:40:28.199" v="254" actId="1076"/>
-      <pc:docMkLst>
-        <pc:docMk/>
-      </pc:docMkLst>
-      <pc:sldChg chg="addSp delSp modSp mod">
-        <pc:chgData name="Trevor Towers" userId="189fe846af54169a" providerId="LiveId" clId="{0DC329F3-2624-4B5B-8F68-7D33A36141B8}" dt="2020-07-29T03:40:28.199" v="254" actId="1076"/>
-        <pc:sldMkLst>
-          <pc:docMk/>
-          <pc:sldMk cId="2846826042" sldId="263"/>
-        </pc:sldMkLst>
-        <pc:spChg chg="del mod">
-          <ac:chgData name="Trevor Towers" userId="189fe846af54169a" providerId="LiveId" clId="{0DC329F3-2624-4B5B-8F68-7D33A36141B8}" dt="2020-07-29T03:09:59.665" v="66" actId="478"/>
-          <ac:spMkLst>
-            <pc:docMk/>
-            <pc:sldMk cId="2846826042" sldId="263"/>
-            <ac:spMk id="3" creationId="{0EFFE4CA-83D5-4648-9D8B-3D114A4D48E8}"/>
-          </ac:spMkLst>
-        </pc:spChg>
-        <pc:spChg chg="add del mod">
-          <ac:chgData name="Trevor Towers" userId="189fe846af54169a" providerId="LiveId" clId="{0DC329F3-2624-4B5B-8F68-7D33A36141B8}" dt="2020-07-29T03:37:43.336" v="72" actId="478"/>
-          <ac:spMkLst>
-            <pc:docMk/>
-            <pc:sldMk cId="2846826042" sldId="263"/>
-            <ac:spMk id="3" creationId="{F0AFFC47-8040-4875-BB1E-098E3C3CD43D}"/>
-          </ac:spMkLst>
-        </pc:spChg>
-        <pc:spChg chg="add mod">
-          <ac:chgData name="Trevor Towers" userId="189fe846af54169a" providerId="LiveId" clId="{0DC329F3-2624-4B5B-8F68-7D33A36141B8}" dt="2020-07-29T03:40:28.199" v="254" actId="1076"/>
-          <ac:spMkLst>
-            <pc:docMk/>
-            <pc:sldMk cId="2846826042" sldId="263"/>
-            <ac:spMk id="4" creationId="{9D32516F-BB4B-4D05-8D9C-61614A1DB6DC}"/>
-          </ac:spMkLst>
-        </pc:spChg>
-        <pc:picChg chg="add mod">
-          <ac:chgData name="Trevor Towers" userId="189fe846af54169a" providerId="LiveId" clId="{0DC329F3-2624-4B5B-8F68-7D33A36141B8}" dt="2020-07-29T03:40:07.884" v="234" actId="1076"/>
-          <ac:picMkLst>
-            <pc:docMk/>
-            <pc:sldMk cId="2846826042" sldId="263"/>
-            <ac:picMk id="5" creationId="{0A8A2697-5161-4C03-B029-333BEB6A097C}"/>
-          </ac:picMkLst>
-        </pc:picChg>
-      </pc:sldChg>
-    </pc:docChg>
-  </pc:docChgLst>
-</pc:chgInfo>
+<file path=ppt/notesSlides/notesSlide1.xml><?xml version="1.0" encoding="utf-8"?>
+<p:notes xmlns:a="http://schemas.openxmlformats.org/drawingml/2006/main" xmlns:r="http://schemas.openxmlformats.org/officeDocument/2006/relationships" xmlns:p="http://schemas.openxmlformats.org/presentationml/2006/main">
+  <p:cSld>
+    <p:spTree>
+      <p:nvGrpSpPr>
+        <p:cNvPr id="1" name=""/>
+        <p:cNvGrpSpPr/>
+        <p:nvPr/>
+      </p:nvGrpSpPr>
+      <p:grpSpPr>
+        <a:xfrm>
+          <a:off x="0" y="0"/>
+          <a:ext cx="0" cy="0"/>
+          <a:chOff x="0" y="0"/>
+          <a:chExt cx="0" cy="0"/>
+        </a:xfrm>
+      </p:grpSpPr>
+      <p:sp>
+        <p:nvSpPr>
+          <p:cNvPr id="2" name="Slide Image Placeholder 1"/>
+          <p:cNvSpPr>
+            <a:spLocks noGrp="1" noRot="1" noChangeAspect="1"/>
+          </p:cNvSpPr>
+          <p:nvPr>
+            <p:ph type="sldImg"/>
+          </p:nvPr>
+        </p:nvSpPr>
+        <p:spPr/>
+      </p:sp>
+      <p:sp>
+        <p:nvSpPr>
+          <p:cNvPr id="3" name="Notes Placeholder 2"/>
+          <p:cNvSpPr>
+            <a:spLocks noGrp="1"/>
+          </p:cNvSpPr>
+          <p:nvPr>
+            <p:ph type="body" idx="1"/>
+          </p:nvPr>
+        </p:nvSpPr>
+        <p:spPr/>
+        <p:txBody>
+          <a:bodyPr/>
+          <a:lstStyle/>
+          <a:p>
+            <a:endParaRPr lang="en-US" dirty="0"/>
+          </a:p>
+        </p:txBody>
+      </p:sp>
+      <p:sp>
+        <p:nvSpPr>
+          <p:cNvPr id="4" name="Slide Number Placeholder 3"/>
+          <p:cNvSpPr>
+            <a:spLocks noGrp="1"/>
+          </p:cNvSpPr>
+          <p:nvPr>
+            <p:ph type="sldNum" sz="quarter" idx="5"/>
+          </p:nvPr>
+        </p:nvSpPr>
+        <p:spPr/>
+        <p:txBody>
+          <a:bodyPr/>
+          <a:lstStyle/>
+          <a:p>
+            <a:fld id="{734749DF-141D-8E4B-867F-726A84A5C9C7}" type="slidenum">
+              <a:rPr lang="en-US" smtClean="0"/>
+              <a:t>6</a:t>
+            </a:fld>
+            <a:endParaRPr lang="en-US"/>
+          </a:p>
+        </p:txBody>
+      </p:sp>
+    </p:spTree>
+    <p:extLst>
+      <p:ext uri="{BB962C8B-B14F-4D97-AF65-F5344CB8AC3E}">
+        <p14:creationId xmlns:p14="http://schemas.microsoft.com/office/powerpoint/2010/main" val="3193401309"/>
+      </p:ext>
+    </p:extLst>
+  </p:cSld>
+  <p:clrMapOvr>
+    <a:masterClrMapping/>
+  </p:clrMapOvr>
+</p:notes>
 </file>
 
 <file path=ppt/slideLayouts/slideLayout1.xml><?xml version="1.0" encoding="utf-8"?>
@@ -416,7 +791,7 @@
             <a:fld id="{B61BEF0D-F0BB-DE4B-95CE-6DB70DBA9567}" type="datetimeFigureOut">
               <a:rPr lang="en-US" smtClean="0"/>
               <a:pPr/>
-              <a:t>7/28/2020</a:t>
+              <a:t>7/28/20</a:t>
             </a:fld>
             <a:endParaRPr lang="en-US" dirty="0"/>
           </a:p>
@@ -751,7 +1126,7 @@
             <a:fld id="{B61BEF0D-F0BB-DE4B-95CE-6DB70DBA9567}" type="datetimeFigureOut">
               <a:rPr lang="en-US" smtClean="0"/>
               <a:pPr/>
-              <a:t>7/28/2020</a:t>
+              <a:t>7/28/20</a:t>
             </a:fld>
             <a:endParaRPr lang="en-US" dirty="0"/>
           </a:p>
@@ -1031,7 +1406,7 @@
             <a:fld id="{B61BEF0D-F0BB-DE4B-95CE-6DB70DBA9567}" type="datetimeFigureOut">
               <a:rPr lang="en-US" smtClean="0"/>
               <a:pPr/>
-              <a:t>7/28/2020</a:t>
+              <a:t>7/28/20</a:t>
             </a:fld>
             <a:endParaRPr lang="en-US" dirty="0"/>
           </a:p>
@@ -1601,7 +1976,7 @@
             <a:fld id="{B61BEF0D-F0BB-DE4B-95CE-6DB70DBA9567}" type="datetimeFigureOut">
               <a:rPr lang="en-US" smtClean="0"/>
               <a:pPr/>
-              <a:t>7/28/2020</a:t>
+              <a:t>7/28/20</a:t>
             </a:fld>
             <a:endParaRPr lang="en-US" dirty="0"/>
           </a:p>
@@ -1881,7 +2256,7 @@
             <a:fld id="{B61BEF0D-F0BB-DE4B-95CE-6DB70DBA9567}" type="datetimeFigureOut">
               <a:rPr lang="en-US" smtClean="0"/>
               <a:pPr/>
-              <a:t>7/28/2020</a:t>
+              <a:t>7/28/20</a:t>
             </a:fld>
             <a:endParaRPr lang="en-US" dirty="0"/>
           </a:p>
@@ -2445,7 +2820,7 @@
             <a:fld id="{B61BEF0D-F0BB-DE4B-95CE-6DB70DBA9567}" type="datetimeFigureOut">
               <a:rPr lang="en-US" smtClean="0"/>
               <a:pPr/>
-              <a:t>7/28/2020</a:t>
+              <a:t>7/28/20</a:t>
             </a:fld>
             <a:endParaRPr lang="en-US" dirty="0"/>
           </a:p>
@@ -2774,7 +3149,7 @@
             <a:fld id="{B61BEF0D-F0BB-DE4B-95CE-6DB70DBA9567}" type="datetimeFigureOut">
               <a:rPr lang="en-US" smtClean="0"/>
               <a:pPr/>
-              <a:t>7/28/2020</a:t>
+              <a:t>7/28/20</a:t>
             </a:fld>
             <a:endParaRPr lang="en-US" dirty="0"/>
           </a:p>
@@ -2981,7 +3356,7 @@
             <a:fld id="{B61BEF0D-F0BB-DE4B-95CE-6DB70DBA9567}" type="datetimeFigureOut">
               <a:rPr lang="en-US" smtClean="0"/>
               <a:pPr/>
-              <a:t>7/28/2020</a:t>
+              <a:t>7/28/20</a:t>
             </a:fld>
             <a:endParaRPr lang="en-US" dirty="0"/>
           </a:p>
@@ -3193,7 +3568,7 @@
             <a:fld id="{B61BEF0D-F0BB-DE4B-95CE-6DB70DBA9567}" type="datetimeFigureOut">
               <a:rPr lang="en-US" smtClean="0"/>
               <a:pPr/>
-              <a:t>7/28/2020</a:t>
+              <a:t>7/28/20</a:t>
             </a:fld>
             <a:endParaRPr lang="en-US" dirty="0"/>
           </a:p>
@@ -3395,7 +3770,7 @@
             <a:fld id="{B61BEF0D-F0BB-DE4B-95CE-6DB70DBA9567}" type="datetimeFigureOut">
               <a:rPr lang="en-US" smtClean="0"/>
               <a:pPr/>
-              <a:t>7/28/2020</a:t>
+              <a:t>7/28/20</a:t>
             </a:fld>
             <a:endParaRPr lang="en-US" dirty="0"/>
           </a:p>
@@ -3673,7 +4048,7 @@
             <a:fld id="{B61BEF0D-F0BB-DE4B-95CE-6DB70DBA9567}" type="datetimeFigureOut">
               <a:rPr lang="en-US" smtClean="0"/>
               <a:pPr/>
-              <a:t>7/28/2020</a:t>
+              <a:t>7/28/20</a:t>
             </a:fld>
             <a:endParaRPr lang="en-US" dirty="0"/>
           </a:p>
@@ -3941,7 +4316,7 @@
             <a:fld id="{B61BEF0D-F0BB-DE4B-95CE-6DB70DBA9567}" type="datetimeFigureOut">
               <a:rPr lang="en-US" smtClean="0"/>
               <a:pPr/>
-              <a:t>7/28/2020</a:t>
+              <a:t>7/28/20</a:t>
             </a:fld>
             <a:endParaRPr lang="en-US" dirty="0"/>
           </a:p>
@@ -4322,7 +4697,7 @@
             <a:fld id="{B61BEF0D-F0BB-DE4B-95CE-6DB70DBA9567}" type="datetimeFigureOut">
               <a:rPr lang="en-US" smtClean="0"/>
               <a:pPr/>
-              <a:t>7/28/2020</a:t>
+              <a:t>7/28/20</a:t>
             </a:fld>
             <a:endParaRPr lang="en-US" dirty="0"/>
           </a:p>
@@ -4472,7 +4847,7 @@
             <a:fld id="{B61BEF0D-F0BB-DE4B-95CE-6DB70DBA9567}" type="datetimeFigureOut">
               <a:rPr lang="en-US" smtClean="0"/>
               <a:pPr/>
-              <a:t>7/28/2020</a:t>
+              <a:t>7/28/20</a:t>
             </a:fld>
             <a:endParaRPr lang="en-US" dirty="0"/>
           </a:p>
@@ -4599,7 +4974,7 @@
             <a:fld id="{B61BEF0D-F0BB-DE4B-95CE-6DB70DBA9567}" type="datetimeFigureOut">
               <a:rPr lang="en-US" smtClean="0"/>
               <a:pPr/>
-              <a:t>7/28/2020</a:t>
+              <a:t>7/28/20</a:t>
             </a:fld>
             <a:endParaRPr lang="en-US" dirty="0"/>
           </a:p>
@@ -4886,7 +5261,7 @@
             <a:fld id="{B61BEF0D-F0BB-DE4B-95CE-6DB70DBA9567}" type="datetimeFigureOut">
               <a:rPr lang="en-US" smtClean="0"/>
               <a:pPr/>
-              <a:t>7/28/2020</a:t>
+              <a:t>7/28/20</a:t>
             </a:fld>
             <a:endParaRPr lang="en-US" dirty="0"/>
           </a:p>
@@ -5216,7 +5591,7 @@
             <a:fld id="{B61BEF0D-F0BB-DE4B-95CE-6DB70DBA9567}" type="datetimeFigureOut">
               <a:rPr lang="en-US" smtClean="0"/>
               <a:pPr/>
-              <a:t>7/28/2020</a:t>
+              <a:t>7/28/20</a:t>
             </a:fld>
             <a:endParaRPr lang="en-US" dirty="0"/>
           </a:p>
@@ -5432,7 +5807,7 @@
             <a:fld id="{B61BEF0D-F0BB-DE4B-95CE-6DB70DBA9567}" type="datetimeFigureOut">
               <a:rPr lang="en-US" smtClean="0"/>
               <a:pPr/>
-              <a:t>7/28/2020</a:t>
+              <a:t>7/28/20</a:t>
             </a:fld>
             <a:endParaRPr lang="en-US" dirty="0"/>
           </a:p>
@@ -6220,7 +6595,12 @@
             <p:ph type="title"/>
           </p:nvPr>
         </p:nvSpPr>
-        <p:spPr/>
+        <p:spPr>
+          <a:xfrm>
+            <a:off x="685800" y="146508"/>
+            <a:ext cx="10131425" cy="1456267"/>
+          </a:xfrm>
+        </p:spPr>
         <p:txBody>
           <a:bodyPr/>
           <a:lstStyle/>
@@ -6238,17 +6618,19 @@
       </p:sp>
       <p:pic>
         <p:nvPicPr>
-          <p:cNvPr id="5" name="Picture 4" descr="A screenshot of a cell phone&#10;&#10;Description automatically generated">
+          <p:cNvPr id="4" name="Content Placeholder 3" descr="A screenshot of a cell phone&#10;&#10;Description automatically generated">
             <a:extLst>
               <a:ext uri="{FF2B5EF4-FFF2-40B4-BE49-F238E27FC236}">
-                <a16:creationId xmlns:a16="http://schemas.microsoft.com/office/drawing/2014/main" id="{0A8A2697-5161-4C03-B029-333BEB6A097C}"/>
+                <a16:creationId xmlns:a16="http://schemas.microsoft.com/office/drawing/2014/main" id="{A1A8A288-4026-7F45-9FC1-003E183CF64A}"/>
               </a:ext>
             </a:extLst>
           </p:cNvPr>
           <p:cNvPicPr>
-            <a:picLocks noChangeAspect="1"/>
+            <a:picLocks noGrp="1" noChangeAspect="1"/>
           </p:cNvPicPr>
-          <p:nvPr/>
+          <p:nvPr>
+            <p:ph idx="1"/>
+          </p:nvPr>
         </p:nvPicPr>
         <p:blipFill>
           <a:blip r:embed="rId2"/>
@@ -6258,49 +6640,14 @@
         </p:blipFill>
         <p:spPr>
           <a:xfrm>
-            <a:off x="2794520" y="2142067"/>
-            <a:ext cx="5487650" cy="3658433"/>
+            <a:off x="2563882" y="1567430"/>
+            <a:ext cx="6375262" cy="4157514"/>
           </a:xfrm>
           <a:prstGeom prst="rect">
             <a:avLst/>
           </a:prstGeom>
         </p:spPr>
       </p:pic>
-      <p:sp>
-        <p:nvSpPr>
-          <p:cNvPr id="4" name="TextBox 3">
-            <a:extLst>
-              <a:ext uri="{FF2B5EF4-FFF2-40B4-BE49-F238E27FC236}">
-                <a16:creationId xmlns:a16="http://schemas.microsoft.com/office/drawing/2014/main" id="{9D32516F-BB4B-4D05-8D9C-61614A1DB6DC}"/>
-              </a:ext>
-            </a:extLst>
-          </p:cNvPr>
-          <p:cNvSpPr txBox="1"/>
-          <p:nvPr/>
-        </p:nvSpPr>
-        <p:spPr>
-          <a:xfrm>
-            <a:off x="4706397" y="5876700"/>
-            <a:ext cx="4015210" cy="369332"/>
-          </a:xfrm>
-          <a:prstGeom prst="rect">
-            <a:avLst/>
-          </a:prstGeom>
-          <a:noFill/>
-        </p:spPr>
-        <p:txBody>
-          <a:bodyPr wrap="square" rtlCol="0">
-            <a:spAutoFit/>
-          </a:bodyPr>
-          <a:lstStyle/>
-          <a:p>
-            <a:r>
-              <a:rPr lang="en-US" dirty="0"/>
-              <a:t> No correlation</a:t>
-            </a:r>
-          </a:p>
-        </p:txBody>
-      </p:sp>
     </p:spTree>
     <p:extLst>
       <p:ext uri="{BB962C8B-B14F-4D97-AF65-F5344CB8AC3E}">
@@ -6386,8 +6733,26 @@
           <a:p>
             <a:r>
               <a:rPr lang="en-US" sz="2800" dirty="0"/>
-              <a:t>Overall conclusions-</a:t>
-            </a:r>
+              <a:t>Lower prevalence of alcohol and smoking correlations to cancer than expected</a:t>
+            </a:r>
+          </a:p>
+          <a:p>
+            <a:r>
+              <a:rPr lang="en-US" sz="2800" dirty="0"/>
+              <a:t>Health insurance has no direct impact (Obamacare)</a:t>
+            </a:r>
+          </a:p>
+          <a:p>
+            <a:r>
+              <a:rPr lang="en-US" sz="2800" dirty="0"/>
+              <a:t>Higher correlation of obesity in cancer death rate across the nation</a:t>
+            </a:r>
+          </a:p>
+          <a:p>
+            <a:pPr marL="0" indent="0">
+              <a:buNone/>
+            </a:pPr>
+            <a:endParaRPr lang="en-US" sz="2800" dirty="0"/>
           </a:p>
         </p:txBody>
       </p:sp>
@@ -6467,10 +6832,47 @@
             <p:ph idx="1"/>
           </p:nvPr>
         </p:nvSpPr>
-        <p:spPr/>
+        <p:spPr>
+          <a:xfrm>
+            <a:off x="685801" y="1375833"/>
+            <a:ext cx="10131425" cy="4106333"/>
+          </a:xfrm>
+        </p:spPr>
         <p:txBody>
           <a:bodyPr/>
           <a:lstStyle/>
+          <a:p>
+            <a:r>
+              <a:rPr lang="en-US" sz="2400" dirty="0"/>
+              <a:t>One of two ways: </a:t>
+            </a:r>
+          </a:p>
+          <a:p>
+            <a:pPr lvl="1"/>
+            <a:r>
+              <a:rPr lang="en-US" sz="2400" dirty="0"/>
+              <a:t>Further research into why obesity is prevalent</a:t>
+            </a:r>
+          </a:p>
+          <a:p>
+            <a:pPr lvl="1"/>
+            <a:r>
+              <a:rPr lang="en-US" sz="2400" dirty="0"/>
+              <a:t>Further research into how smoking and alcohol are not as prevalent </a:t>
+            </a:r>
+          </a:p>
+          <a:p>
+            <a:r>
+              <a:rPr lang="en-US" sz="2400" dirty="0"/>
+              <a:t>Look into data before and after state law changes</a:t>
+            </a:r>
+          </a:p>
+          <a:p>
+            <a:r>
+              <a:rPr lang="en-US" sz="2400" dirty="0"/>
+              <a:t>Requests for further funding to continue research</a:t>
+            </a:r>
+          </a:p>
           <a:p>
             <a:endParaRPr lang="en-US" dirty="0"/>
           </a:p>
@@ -6811,13 +7213,7 @@
           <a:p>
             <a:r>
               <a:rPr lang="en-US" sz="3000" dirty="0"/>
-              <a:t>Initial interest - highest and lowest cancer rates by state.</a:t>
-            </a:r>
-          </a:p>
-          <a:p>
-            <a:r>
-              <a:rPr lang="en-US" sz="3000" dirty="0"/>
-              <a:t>Expanded from there:</a:t>
+              <a:t>Challenged to research cancer topics including common lifestyle choices: </a:t>
             </a:r>
           </a:p>
           <a:p>
@@ -6878,7 +7274,20 @@
                   <a:srgbClr val="FFC000"/>
                 </a:solidFill>
               </a:rPr>
-              <a:t>   PROJECT QUESTION:</a:t>
+              <a:t>   </a:t>
+            </a:r>
+          </a:p>
+          <a:p>
+            <a:pPr marL="0" indent="0">
+              <a:buNone/>
+            </a:pPr>
+            <a:r>
+              <a:rPr lang="en-US" sz="3000" b="1" dirty="0">
+                <a:solidFill>
+                  <a:srgbClr val="FFC000"/>
+                </a:solidFill>
+              </a:rPr>
+              <a:t>   RESEARCH QUESTION:</a:t>
             </a:r>
           </a:p>
           <a:p>
@@ -6967,14 +7376,14 @@
             </a:br>
             <a:r>
               <a:rPr lang="en-US" sz="2400" dirty="0"/>
-              <a:t>Kentucky (Highest)   </a:t>
+              <a:t>2017 DATA </a:t>
             </a:r>
             <a:br>
               <a:rPr lang="en-US" sz="2400" dirty="0"/>
             </a:br>
             <a:r>
-              <a:rPr lang="en-US" sz="2400" dirty="0"/>
-              <a:t>Utah (Lowest</a:t>
+              <a:rPr lang="en-US" sz="2000" dirty="0"/>
+              <a:t>Kentucky (Highest) and Utah (Lowest)</a:t>
             </a:r>
           </a:p>
         </p:txBody>
@@ -7024,6 +7433,15 @@
 <file path=ppt/slides/slide5.xml><?xml version="1.0" encoding="utf-8"?>
 <p:sld xmlns:a="http://schemas.openxmlformats.org/drawingml/2006/main" xmlns:r="http://schemas.openxmlformats.org/officeDocument/2006/relationships" xmlns:p="http://schemas.openxmlformats.org/presentationml/2006/main">
   <p:cSld>
+    <p:bg>
+      <p:bgPr>
+        <a:blipFill>
+          <a:blip r:embed="rId2"/>
+          <a:stretch/>
+        </a:blipFill>
+        <a:effectLst/>
+      </p:bgPr>
+    </p:bg>
     <p:spTree>
       <p:nvGrpSpPr>
         <p:cNvPr id="1" name=""/>
@@ -7056,8 +7474,8 @@
         </p:nvSpPr>
         <p:spPr>
           <a:xfrm>
-            <a:off x="1030286" y="179294"/>
-            <a:ext cx="10131425" cy="1456267"/>
+            <a:off x="603572" y="797057"/>
+            <a:ext cx="4586736" cy="1035579"/>
           </a:xfrm>
         </p:spPr>
         <p:txBody>
@@ -7066,9 +7484,13 @@
           </a:bodyPr>
           <a:lstStyle/>
           <a:p>
-            <a:pPr algn="ctr"/>
-            <a:r>
-              <a:rPr lang="en-US" sz="4000" dirty="0"/>
+            <a:pPr>
+              <a:lnSpc>
+                <a:spcPct val="90000"/>
+              </a:lnSpc>
+            </a:pPr>
+            <a:r>
+              <a:rPr lang="en-US" sz="3300" dirty="0"/>
               <a:t>DATA USED and defined</a:t>
             </a:r>
           </a:p>
@@ -7092,8 +7514,8 @@
         </p:nvSpPr>
         <p:spPr>
           <a:xfrm>
-            <a:off x="1030287" y="2065867"/>
-            <a:ext cx="10131425" cy="3649133"/>
+            <a:off x="603572" y="882136"/>
+            <a:ext cx="6696130" cy="4034353"/>
           </a:xfrm>
         </p:spPr>
         <p:txBody>
@@ -7103,30 +7525,146 @@
           <a:lstStyle/>
           <a:p>
             <a:r>
-              <a:rPr lang="en-US" sz="2800" dirty="0"/>
-              <a:t>Mostly CDC</a:t>
-            </a:r>
-          </a:p>
-          <a:p>
-            <a:r>
-              <a:rPr lang="en-US" sz="2800" dirty="0"/>
-              <a:t>Census Data</a:t>
-            </a:r>
-          </a:p>
-          <a:p>
-            <a:r>
-              <a:rPr lang="en-US" sz="2800" dirty="0"/>
-              <a:t>Age Adjusted Rate </a:t>
-            </a:r>
-          </a:p>
-          <a:p>
-            <a:r>
-              <a:rPr lang="en-US" sz="2800" dirty="0"/>
-              <a:t>Poverty Line</a:t>
-            </a:r>
-          </a:p>
-        </p:txBody>
-      </p:sp>
+              <a:rPr lang="en-US" sz="2400" dirty="0"/>
+              <a:t>Mostly pulled from Centers Disease Control - 2017</a:t>
+            </a:r>
+          </a:p>
+          <a:p>
+            <a:r>
+              <a:rPr lang="en-US" sz="2400" dirty="0"/>
+              <a:t>Census Data - 5 year rolling  2013-2017</a:t>
+            </a:r>
+          </a:p>
+          <a:p>
+            <a:r>
+              <a:rPr lang="en-US" sz="2400" dirty="0"/>
+              <a:t>Death count was adjusted for differences in age distributions</a:t>
+            </a:r>
+          </a:p>
+          <a:p>
+            <a:r>
+              <a:rPr lang="en-US" sz="2400" dirty="0"/>
+              <a:t>Alcohol binge drinking data - 2015</a:t>
+            </a:r>
+          </a:p>
+        </p:txBody>
+      </p:sp>
+      <p:pic>
+        <p:nvPicPr>
+          <p:cNvPr id="5" name="Picture 4" descr="A picture containing food&#10;&#10;Description automatically generated">
+            <a:extLst>
+              <a:ext uri="{FF2B5EF4-FFF2-40B4-BE49-F238E27FC236}">
+                <a16:creationId xmlns:a16="http://schemas.microsoft.com/office/drawing/2014/main" id="{A28A388C-3FF2-1541-8BED-542ECC6F8422}"/>
+              </a:ext>
+            </a:extLst>
+          </p:cNvPr>
+          <p:cNvPicPr>
+            <a:picLocks noChangeAspect="1"/>
+          </p:cNvPicPr>
+          <p:nvPr/>
+        </p:nvPicPr>
+        <p:blipFill>
+          <a:blip r:embed="rId3"/>
+          <a:stretch>
+            <a:fillRect/>
+          </a:stretch>
+        </p:blipFill>
+        <p:spPr>
+          <a:xfrm>
+            <a:off x="7857641" y="1285338"/>
+            <a:ext cx="2710176" cy="2046183"/>
+          </a:xfrm>
+          <a:prstGeom prst="roundRect">
+            <a:avLst>
+              <a:gd name="adj" fmla="val 6267"/>
+            </a:avLst>
+          </a:prstGeom>
+          <a:ln w="50800" cap="sq" cmpd="dbl">
+            <a:gradFill flip="none" rotWithShape="1">
+              <a:gsLst>
+                <a:gs pos="0">
+                  <a:srgbClr val="FFFFFF"/>
+                </a:gs>
+                <a:gs pos="100000">
+                  <a:schemeClr val="tx1">
+                    <a:alpha val="0"/>
+                  </a:schemeClr>
+                </a:gs>
+              </a:gsLst>
+              <a:path path="circle">
+                <a:fillToRect l="50000" t="50000" r="50000" b="50000"/>
+              </a:path>
+              <a:tileRect/>
+            </a:gradFill>
+            <a:miter lim="800000"/>
+          </a:ln>
+          <a:effectLst>
+            <a:outerShdw blurRad="254000" algn="tl" rotWithShape="0">
+              <a:srgbClr val="000000">
+                <a:alpha val="43000"/>
+              </a:srgbClr>
+            </a:outerShdw>
+          </a:effectLst>
+        </p:spPr>
+      </p:pic>
+      <p:pic>
+        <p:nvPicPr>
+          <p:cNvPr id="7" name="Picture 6" descr="A picture containing drawing, plate&#10;&#10;Description automatically generated">
+            <a:extLst>
+              <a:ext uri="{FF2B5EF4-FFF2-40B4-BE49-F238E27FC236}">
+                <a16:creationId xmlns:a16="http://schemas.microsoft.com/office/drawing/2014/main" id="{64F30B31-9A53-664F-8A2D-505C6EEE3FE3}"/>
+              </a:ext>
+            </a:extLst>
+          </p:cNvPr>
+          <p:cNvPicPr>
+            <a:picLocks noChangeAspect="1"/>
+          </p:cNvPicPr>
+          <p:nvPr/>
+        </p:nvPicPr>
+        <p:blipFill>
+          <a:blip r:embed="rId4"/>
+          <a:stretch>
+            <a:fillRect/>
+          </a:stretch>
+        </p:blipFill>
+        <p:spPr>
+          <a:xfrm>
+            <a:off x="6159800" y="4165982"/>
+            <a:ext cx="4408017" cy="1671171"/>
+          </a:xfrm>
+          <a:prstGeom prst="roundRect">
+            <a:avLst>
+              <a:gd name="adj" fmla="val 6267"/>
+            </a:avLst>
+          </a:prstGeom>
+          <a:ln w="50800" cap="sq" cmpd="dbl">
+            <a:gradFill flip="none" rotWithShape="1">
+              <a:gsLst>
+                <a:gs pos="0">
+                  <a:srgbClr val="FFFFFF"/>
+                </a:gs>
+                <a:gs pos="100000">
+                  <a:schemeClr val="tx1">
+                    <a:alpha val="0"/>
+                  </a:schemeClr>
+                </a:gs>
+              </a:gsLst>
+              <a:path path="circle">
+                <a:fillToRect l="50000" t="50000" r="50000" b="50000"/>
+              </a:path>
+              <a:tileRect/>
+            </a:gradFill>
+            <a:miter lim="800000"/>
+          </a:ln>
+          <a:effectLst>
+            <a:outerShdw blurRad="254000" algn="tl" rotWithShape="0">
+              <a:srgbClr val="000000">
+                <a:alpha val="43000"/>
+              </a:srgbClr>
+            </a:outerShdw>
+          </a:effectLst>
+        </p:spPr>
+      </p:pic>
     </p:spTree>
     <p:extLst>
       <p:ext uri="{BB962C8B-B14F-4D97-AF65-F5344CB8AC3E}">
@@ -7143,6 +7681,15 @@
 <file path=ppt/slides/slide6.xml><?xml version="1.0" encoding="utf-8"?>
 <p:sld xmlns:a="http://schemas.openxmlformats.org/drawingml/2006/main" xmlns:r="http://schemas.openxmlformats.org/officeDocument/2006/relationships" xmlns:p="http://schemas.openxmlformats.org/presentationml/2006/main">
   <p:cSld>
+    <p:bg>
+      <p:bgPr>
+        <a:blipFill>
+          <a:blip r:embed="rId3"/>
+          <a:stretch/>
+        </a:blipFill>
+        <a:effectLst/>
+      </p:bgPr>
+    </p:bg>
     <p:spTree>
       <p:nvGrpSpPr>
         <p:cNvPr id="1" name=""/>
@@ -7173,7 +7720,12 @@
             <p:ph type="title"/>
           </p:nvPr>
         </p:nvSpPr>
-        <p:spPr/>
+        <p:spPr>
+          <a:xfrm>
+            <a:off x="4754384" y="609599"/>
+            <a:ext cx="6282266" cy="1456267"/>
+          </a:xfrm>
+        </p:spPr>
         <p:txBody>
           <a:bodyPr>
             <a:normAutofit/>
@@ -7181,7 +7733,7 @@
           <a:lstStyle/>
           <a:p>
             <a:r>
-              <a:rPr lang="en-US" sz="4000" dirty="0"/>
+              <a:rPr lang="en-US"/>
               <a:t>Data exploration and cleanup process</a:t>
             </a:r>
           </a:p>
@@ -7205,8 +7757,8 @@
         </p:nvSpPr>
         <p:spPr>
           <a:xfrm>
-            <a:off x="685801" y="1819337"/>
-            <a:ext cx="10131425" cy="3649133"/>
+            <a:off x="4754384" y="2142066"/>
+            <a:ext cx="6282266" cy="3649133"/>
           </a:xfrm>
         </p:spPr>
         <p:txBody>
@@ -7216,36 +7768,94 @@
           <a:lstStyle/>
           <a:p>
             <a:r>
-              <a:rPr lang="en-US" sz="2800" dirty="0"/>
+              <a:rPr lang="en-US" sz="2400" dirty="0"/>
               <a:t>Finding data by state</a:t>
             </a:r>
           </a:p>
           <a:p>
             <a:r>
-              <a:rPr lang="en-US" sz="2800" dirty="0"/>
+              <a:rPr lang="en-US" sz="2400" dirty="0"/>
               <a:t>Correlating data by year </a:t>
             </a:r>
           </a:p>
           <a:p>
             <a:r>
-              <a:rPr lang="en-US" sz="2800" dirty="0"/>
+              <a:rPr lang="en-US" sz="2400" dirty="0"/>
               <a:t>Merging with state abbreviations</a:t>
             </a:r>
           </a:p>
           <a:p>
             <a:r>
-              <a:rPr lang="en-US" sz="2800" dirty="0"/>
+              <a:rPr lang="en-US" sz="2400" dirty="0"/>
               <a:t>Dropping unwanted columns</a:t>
             </a:r>
           </a:p>
           <a:p>
             <a:r>
-              <a:rPr lang="en-US" sz="2800" dirty="0"/>
+              <a:rPr lang="en-US" sz="2400" dirty="0"/>
               <a:t>Cleaning data wrapped in (“ “)</a:t>
             </a:r>
           </a:p>
         </p:txBody>
       </p:sp>
+      <p:pic>
+        <p:nvPicPr>
+          <p:cNvPr id="5" name="Picture 4" descr="A picture containing table&#10;&#10;Description automatically generated">
+            <a:extLst>
+              <a:ext uri="{FF2B5EF4-FFF2-40B4-BE49-F238E27FC236}">
+                <a16:creationId xmlns:a16="http://schemas.microsoft.com/office/drawing/2014/main" id="{FBB8FE6A-1016-2749-842D-6E0D03C22BD9}"/>
+              </a:ext>
+            </a:extLst>
+          </p:cNvPr>
+          <p:cNvPicPr>
+            <a:picLocks noChangeAspect="1"/>
+          </p:cNvPicPr>
+          <p:nvPr/>
+        </p:nvPicPr>
+        <p:blipFill>
+          <a:blip r:embed="rId4"/>
+          <a:stretch>
+            <a:fillRect/>
+          </a:stretch>
+        </p:blipFill>
+        <p:spPr>
+          <a:xfrm>
+            <a:off x="685800" y="2284104"/>
+            <a:ext cx="3445714" cy="2292966"/>
+          </a:xfrm>
+          <a:prstGeom prst="roundRect">
+            <a:avLst>
+              <a:gd name="adj" fmla="val 4380"/>
+            </a:avLst>
+          </a:prstGeom>
+          <a:ln w="50800" cap="sq" cmpd="dbl">
+            <a:gradFill flip="none" rotWithShape="1">
+              <a:gsLst>
+                <a:gs pos="0">
+                  <a:srgbClr val="FFFFFF"/>
+                </a:gs>
+                <a:gs pos="100000">
+                  <a:schemeClr val="tx1">
+                    <a:alpha val="0"/>
+                  </a:schemeClr>
+                </a:gs>
+              </a:gsLst>
+              <a:path path="circle">
+                <a:fillToRect l="50000" t="50000" r="50000" b="50000"/>
+              </a:path>
+              <a:tileRect/>
+            </a:gradFill>
+            <a:miter lim="800000"/>
+          </a:ln>
+          <a:effectLst>
+            <a:outerShdw blurRad="254000" algn="tl" rotWithShape="0">
+              <a:srgbClr val="000000">
+                <a:alpha val="43000"/>
+              </a:srgbClr>
+            </a:outerShdw>
+          </a:effectLst>
+        </p:spPr>
+      </p:pic>
     </p:spTree>
     <p:extLst>
       <p:ext uri="{BB962C8B-B14F-4D97-AF65-F5344CB8AC3E}">
@@ -7410,7 +8020,7 @@
           <a:p>
             <a:pPr algn="ctr"/>
             <a:r>
-              <a:rPr lang="en-US" sz="2400" dirty="0"/>
+              <a:rPr lang="en-US" sz="2400" u="sng" dirty="0"/>
               <a:t>Wine Consumption</a:t>
             </a:r>
           </a:p>
@@ -7525,7 +8135,7 @@
         </p:nvSpPr>
         <p:spPr>
           <a:xfrm>
-            <a:off x="486877" y="1756147"/>
+            <a:off x="507802" y="1079380"/>
             <a:ext cx="5076230" cy="2601011"/>
           </a:xfrm>
         </p:spPr>
@@ -7997,7 +8607,7 @@
         </p:nvSpPr>
         <p:spPr>
           <a:xfrm>
-            <a:off x="663841" y="4564096"/>
+            <a:off x="663841" y="4194765"/>
             <a:ext cx="5195783" cy="2031325"/>
           </a:xfrm>
           <a:prstGeom prst="rect">
@@ -8258,10 +8868,9 @@
           <a:lstStyle/>
           <a:p>
             <a:r>
-              <a:rPr lang="en-US" sz="1800"/>
+              <a:rPr lang="en-US" sz="1800" dirty="0"/>
               <a:t>*Death count was adjusted for differences in age distributions</a:t>
             </a:r>
-            <a:endParaRPr lang="en-US" sz="1800" dirty="0"/>
           </a:p>
         </p:txBody>
       </p:sp>
@@ -8354,7 +8963,7 @@
           <a:lstStyle/>
           <a:p>
             <a:r>
-              <a:rPr lang="en-US" sz="1200"/>
+              <a:rPr lang="en-US" sz="1200" dirty="0"/>
               <a:t>The correlation between age rate and median household income age is -0.45</a:t>
             </a:r>
           </a:p>
@@ -8683,4 +9292,299 @@
     </a:ext>
   </a:extLst>
 </a:theme>
+</file>
+
+<file path=ppt/theme/theme2.xml><?xml version="1.0" encoding="utf-8"?>
+<a:theme xmlns:a="http://schemas.openxmlformats.org/drawingml/2006/main" name="Office Theme">
+  <a:themeElements>
+    <a:clrScheme name="Office">
+      <a:dk1>
+        <a:sysClr val="windowText" lastClr="000000"/>
+      </a:dk1>
+      <a:lt1>
+        <a:sysClr val="window" lastClr="FFFFFF"/>
+      </a:lt1>
+      <a:dk2>
+        <a:srgbClr val="44546A"/>
+      </a:dk2>
+      <a:lt2>
+        <a:srgbClr val="E7E6E6"/>
+      </a:lt2>
+      <a:accent1>
+        <a:srgbClr val="4472C4"/>
+      </a:accent1>
+      <a:accent2>
+        <a:srgbClr val="ED7D31"/>
+      </a:accent2>
+      <a:accent3>
+        <a:srgbClr val="A5A5A5"/>
+      </a:accent3>
+      <a:accent4>
+        <a:srgbClr val="FFC000"/>
+      </a:accent4>
+      <a:accent5>
+        <a:srgbClr val="5B9BD5"/>
+      </a:accent5>
+      <a:accent6>
+        <a:srgbClr val="70AD47"/>
+      </a:accent6>
+      <a:hlink>
+        <a:srgbClr val="0563C1"/>
+      </a:hlink>
+      <a:folHlink>
+        <a:srgbClr val="954F72"/>
+      </a:folHlink>
+    </a:clrScheme>
+    <a:fontScheme name="Office">
+      <a:majorFont>
+        <a:latin typeface="Calibri Light" panose="020F0302020204030204"/>
+        <a:ea typeface=""/>
+        <a:cs typeface=""/>
+        <a:font script="Jpan" typeface="游ゴシック Light"/>
+        <a:font script="Hang" typeface="맑은 고딕"/>
+        <a:font script="Hans" typeface="等线 Light"/>
+        <a:font script="Hant" typeface="新細明體"/>
+        <a:font script="Arab" typeface="Times New Roman"/>
+        <a:font script="Hebr" typeface="Times New Roman"/>
+        <a:font script="Thai" typeface="Angsana New"/>
+        <a:font script="Ethi" typeface="Nyala"/>
+        <a:font script="Beng" typeface="Vrinda"/>
+        <a:font script="Gujr" typeface="Shruti"/>
+        <a:font script="Khmr" typeface="MoolBoran"/>
+        <a:font script="Knda" typeface="Tunga"/>
+        <a:font script="Guru" typeface="Raavi"/>
+        <a:font script="Cans" typeface="Euphemia"/>
+        <a:font script="Cher" typeface="Plantagenet Cherokee"/>
+        <a:font script="Yiii" typeface="Microsoft Yi Baiti"/>
+        <a:font script="Tibt" typeface="Microsoft Himalaya"/>
+        <a:font script="Thaa" typeface="MV Boli"/>
+        <a:font script="Deva" typeface="Mangal"/>
+        <a:font script="Telu" typeface="Gautami"/>
+        <a:font script="Taml" typeface="Latha"/>
+        <a:font script="Syrc" typeface="Estrangelo Edessa"/>
+        <a:font script="Orya" typeface="Kalinga"/>
+        <a:font script="Mlym" typeface="Kartika"/>
+        <a:font script="Laoo" typeface="DokChampa"/>
+        <a:font script="Sinh" typeface="Iskoola Pota"/>
+        <a:font script="Mong" typeface="Mongolian Baiti"/>
+        <a:font script="Viet" typeface="Times New Roman"/>
+        <a:font script="Uigh" typeface="Microsoft Uighur"/>
+        <a:font script="Geor" typeface="Sylfaen"/>
+        <a:font script="Armn" typeface="Arial"/>
+        <a:font script="Bugi" typeface="Leelawadee UI"/>
+        <a:font script="Bopo" typeface="Microsoft JhengHei"/>
+        <a:font script="Java" typeface="Javanese Text"/>
+        <a:font script="Lisu" typeface="Segoe UI"/>
+        <a:font script="Mymr" typeface="Myanmar Text"/>
+        <a:font script="Nkoo" typeface="Ebrima"/>
+        <a:font script="Olck" typeface="Nirmala UI"/>
+        <a:font script="Osma" typeface="Ebrima"/>
+        <a:font script="Phag" typeface="Phagspa"/>
+        <a:font script="Syrn" typeface="Estrangelo Edessa"/>
+        <a:font script="Syrj" typeface="Estrangelo Edessa"/>
+        <a:font script="Syre" typeface="Estrangelo Edessa"/>
+        <a:font script="Sora" typeface="Nirmala UI"/>
+        <a:font script="Tale" typeface="Microsoft Tai Le"/>
+        <a:font script="Talu" typeface="Microsoft New Tai Lue"/>
+        <a:font script="Tfng" typeface="Ebrima"/>
+      </a:majorFont>
+      <a:minorFont>
+        <a:latin typeface="Calibri" panose="020F0502020204030204"/>
+        <a:ea typeface=""/>
+        <a:cs typeface=""/>
+        <a:font script="Jpan" typeface="游ゴシック"/>
+        <a:font script="Hang" typeface="맑은 고딕"/>
+        <a:font script="Hans" typeface="等线"/>
+        <a:font script="Hant" typeface="新細明體"/>
+        <a:font script="Arab" typeface="Arial"/>
+        <a:font script="Hebr" typeface="Arial"/>
+        <a:font script="Thai" typeface="Cordia New"/>
+        <a:font script="Ethi" typeface="Nyala"/>
+        <a:font script="Beng" typeface="Vrinda"/>
+        <a:font script="Gujr" typeface="Shruti"/>
+        <a:font script="Khmr" typeface="DaunPenh"/>
+        <a:font script="Knda" typeface="Tunga"/>
+        <a:font script="Guru" typeface="Raavi"/>
+        <a:font script="Cans" typeface="Euphemia"/>
+        <a:font script="Cher" typeface="Plantagenet Cherokee"/>
+        <a:font script="Yiii" typeface="Microsoft Yi Baiti"/>
+        <a:font script="Tibt" typeface="Microsoft Himalaya"/>
+        <a:font script="Thaa" typeface="MV Boli"/>
+        <a:font script="Deva" typeface="Mangal"/>
+        <a:font script="Telu" typeface="Gautami"/>
+        <a:font script="Taml" typeface="Latha"/>
+        <a:font script="Syrc" typeface="Estrangelo Edessa"/>
+        <a:font script="Orya" typeface="Kalinga"/>
+        <a:font script="Mlym" typeface="Kartika"/>
+        <a:font script="Laoo" typeface="DokChampa"/>
+        <a:font script="Sinh" typeface="Iskoola Pota"/>
+        <a:font script="Mong" typeface="Mongolian Baiti"/>
+        <a:font script="Viet" typeface="Arial"/>
+        <a:font script="Uigh" typeface="Microsoft Uighur"/>
+        <a:font script="Geor" typeface="Sylfaen"/>
+        <a:font script="Armn" typeface="Arial"/>
+        <a:font script="Bugi" typeface="Leelawadee UI"/>
+        <a:font script="Bopo" typeface="Microsoft JhengHei"/>
+        <a:font script="Java" typeface="Javanese Text"/>
+        <a:font script="Lisu" typeface="Segoe UI"/>
+        <a:font script="Mymr" typeface="Myanmar Text"/>
+        <a:font script="Nkoo" typeface="Ebrima"/>
+        <a:font script="Olck" typeface="Nirmala UI"/>
+        <a:font script="Osma" typeface="Ebrima"/>
+        <a:font script="Phag" typeface="Phagspa"/>
+        <a:font script="Syrn" typeface="Estrangelo Edessa"/>
+        <a:font script="Syrj" typeface="Estrangelo Edessa"/>
+        <a:font script="Syre" typeface="Estrangelo Edessa"/>
+        <a:font script="Sora" typeface="Nirmala UI"/>
+        <a:font script="Tale" typeface="Microsoft Tai Le"/>
+        <a:font script="Talu" typeface="Microsoft New Tai Lue"/>
+        <a:font script="Tfng" typeface="Ebrima"/>
+      </a:minorFont>
+    </a:fontScheme>
+    <a:fmtScheme name="Office">
+      <a:fillStyleLst>
+        <a:solidFill>
+          <a:schemeClr val="phClr"/>
+        </a:solidFill>
+        <a:gradFill rotWithShape="1">
+          <a:gsLst>
+            <a:gs pos="0">
+              <a:schemeClr val="phClr">
+                <a:lumMod val="110000"/>
+                <a:satMod val="105000"/>
+                <a:tint val="67000"/>
+              </a:schemeClr>
+            </a:gs>
+            <a:gs pos="50000">
+              <a:schemeClr val="phClr">
+                <a:lumMod val="105000"/>
+                <a:satMod val="103000"/>
+                <a:tint val="73000"/>
+              </a:schemeClr>
+            </a:gs>
+            <a:gs pos="100000">
+              <a:schemeClr val="phClr">
+                <a:lumMod val="105000"/>
+                <a:satMod val="109000"/>
+                <a:tint val="81000"/>
+              </a:schemeClr>
+            </a:gs>
+          </a:gsLst>
+          <a:lin ang="5400000" scaled="0"/>
+        </a:gradFill>
+        <a:gradFill rotWithShape="1">
+          <a:gsLst>
+            <a:gs pos="0">
+              <a:schemeClr val="phClr">
+                <a:satMod val="103000"/>
+                <a:lumMod val="102000"/>
+                <a:tint val="94000"/>
+              </a:schemeClr>
+            </a:gs>
+            <a:gs pos="50000">
+              <a:schemeClr val="phClr">
+                <a:satMod val="110000"/>
+                <a:lumMod val="100000"/>
+                <a:shade val="100000"/>
+              </a:schemeClr>
+            </a:gs>
+            <a:gs pos="100000">
+              <a:schemeClr val="phClr">
+                <a:lumMod val="99000"/>
+                <a:satMod val="120000"/>
+                <a:shade val="78000"/>
+              </a:schemeClr>
+            </a:gs>
+          </a:gsLst>
+          <a:lin ang="5400000" scaled="0"/>
+        </a:gradFill>
+      </a:fillStyleLst>
+      <a:lnStyleLst>
+        <a:ln w="6350" cap="flat" cmpd="sng" algn="ctr">
+          <a:solidFill>
+            <a:schemeClr val="phClr"/>
+          </a:solidFill>
+          <a:prstDash val="solid"/>
+          <a:miter lim="800000"/>
+        </a:ln>
+        <a:ln w="12700" cap="flat" cmpd="sng" algn="ctr">
+          <a:solidFill>
+            <a:schemeClr val="phClr"/>
+          </a:solidFill>
+          <a:prstDash val="solid"/>
+          <a:miter lim="800000"/>
+        </a:ln>
+        <a:ln w="19050" cap="flat" cmpd="sng" algn="ctr">
+          <a:solidFill>
+            <a:schemeClr val="phClr"/>
+          </a:solidFill>
+          <a:prstDash val="solid"/>
+          <a:miter lim="800000"/>
+        </a:ln>
+      </a:lnStyleLst>
+      <a:effectStyleLst>
+        <a:effectStyle>
+          <a:effectLst/>
+        </a:effectStyle>
+        <a:effectStyle>
+          <a:effectLst/>
+        </a:effectStyle>
+        <a:effectStyle>
+          <a:effectLst>
+            <a:outerShdw blurRad="57150" dist="19050" dir="5400000" algn="ctr" rotWithShape="0">
+              <a:srgbClr val="000000">
+                <a:alpha val="63000"/>
+              </a:srgbClr>
+            </a:outerShdw>
+          </a:effectLst>
+        </a:effectStyle>
+      </a:effectStyleLst>
+      <a:bgFillStyleLst>
+        <a:solidFill>
+          <a:schemeClr val="phClr"/>
+        </a:solidFill>
+        <a:solidFill>
+          <a:schemeClr val="phClr">
+            <a:tint val="95000"/>
+            <a:satMod val="170000"/>
+          </a:schemeClr>
+        </a:solidFill>
+        <a:gradFill rotWithShape="1">
+          <a:gsLst>
+            <a:gs pos="0">
+              <a:schemeClr val="phClr">
+                <a:tint val="93000"/>
+                <a:satMod val="150000"/>
+                <a:shade val="98000"/>
+                <a:lumMod val="102000"/>
+              </a:schemeClr>
+            </a:gs>
+            <a:gs pos="50000">
+              <a:schemeClr val="phClr">
+                <a:tint val="98000"/>
+                <a:satMod val="130000"/>
+                <a:shade val="90000"/>
+                <a:lumMod val="103000"/>
+              </a:schemeClr>
+            </a:gs>
+            <a:gs pos="100000">
+              <a:schemeClr val="phClr">
+                <a:shade val="63000"/>
+                <a:satMod val="120000"/>
+              </a:schemeClr>
+            </a:gs>
+          </a:gsLst>
+          <a:lin ang="5400000" scaled="0"/>
+        </a:gradFill>
+      </a:bgFillStyleLst>
+    </a:fmtScheme>
+  </a:themeElements>
+  <a:objectDefaults/>
+  <a:extraClrSchemeLst/>
+  <a:extLst>
+    <a:ext uri="{05A4C25C-085E-4340-85A3-A5531E510DB2}">
+      <thm15:themeFamily xmlns:thm15="http://schemas.microsoft.com/office/thememl/2012/main" name="Office Theme" id="{62F939B6-93AF-4DB8-9C6B-D6C7DFDC589F}" vid="{4A3C46E8-61CC-4603-A589-7422A47A8E4A}"/>
+    </a:ext>
+  </a:extLst>
+</a:theme>
 </file>
</xml_diff>

<commit_message>
Updating "What does all this Mean" in power point
</commit_message>
<xml_diff>
--- a/Project_One_BTTV.pptx
+++ b/Project_One_BTTV.pptx
@@ -211,7 +211,7 @@
           <a:p>
             <a:fld id="{CDA160FB-BC7D-614F-8FEF-B8325232A817}" type="datetimeFigureOut">
               <a:rPr lang="en-US" smtClean="0"/>
-              <a:t>7/30/20</a:t>
+              <a:t>7/30/2020</a:t>
             </a:fld>
             <a:endParaRPr lang="en-US" dirty="0"/>
           </a:p>
@@ -960,7 +960,7 @@
             <a:fld id="{B61BEF0D-F0BB-DE4B-95CE-6DB70DBA9567}" type="datetimeFigureOut">
               <a:rPr lang="en-US" smtClean="0"/>
               <a:pPr/>
-              <a:t>7/30/20</a:t>
+              <a:t>7/30/2020</a:t>
             </a:fld>
             <a:endParaRPr lang="en-US" dirty="0"/>
           </a:p>
@@ -1295,7 +1295,7 @@
             <a:fld id="{B61BEF0D-F0BB-DE4B-95CE-6DB70DBA9567}" type="datetimeFigureOut">
               <a:rPr lang="en-US" smtClean="0"/>
               <a:pPr/>
-              <a:t>7/30/20</a:t>
+              <a:t>7/30/2020</a:t>
             </a:fld>
             <a:endParaRPr lang="en-US" dirty="0"/>
           </a:p>
@@ -1575,7 +1575,7 @@
             <a:fld id="{B61BEF0D-F0BB-DE4B-95CE-6DB70DBA9567}" type="datetimeFigureOut">
               <a:rPr lang="en-US" smtClean="0"/>
               <a:pPr/>
-              <a:t>7/30/20</a:t>
+              <a:t>7/30/2020</a:t>
             </a:fld>
             <a:endParaRPr lang="en-US" dirty="0"/>
           </a:p>
@@ -2145,7 +2145,7 @@
             <a:fld id="{B61BEF0D-F0BB-DE4B-95CE-6DB70DBA9567}" type="datetimeFigureOut">
               <a:rPr lang="en-US" smtClean="0"/>
               <a:pPr/>
-              <a:t>7/30/20</a:t>
+              <a:t>7/30/2020</a:t>
             </a:fld>
             <a:endParaRPr lang="en-US" dirty="0"/>
           </a:p>
@@ -2425,7 +2425,7 @@
             <a:fld id="{B61BEF0D-F0BB-DE4B-95CE-6DB70DBA9567}" type="datetimeFigureOut">
               <a:rPr lang="en-US" smtClean="0"/>
               <a:pPr/>
-              <a:t>7/30/20</a:t>
+              <a:t>7/30/2020</a:t>
             </a:fld>
             <a:endParaRPr lang="en-US" dirty="0"/>
           </a:p>
@@ -2989,7 +2989,7 @@
             <a:fld id="{B61BEF0D-F0BB-DE4B-95CE-6DB70DBA9567}" type="datetimeFigureOut">
               <a:rPr lang="en-US" smtClean="0"/>
               <a:pPr/>
-              <a:t>7/30/20</a:t>
+              <a:t>7/30/2020</a:t>
             </a:fld>
             <a:endParaRPr lang="en-US" dirty="0"/>
           </a:p>
@@ -3318,7 +3318,7 @@
             <a:fld id="{B61BEF0D-F0BB-DE4B-95CE-6DB70DBA9567}" type="datetimeFigureOut">
               <a:rPr lang="en-US" smtClean="0"/>
               <a:pPr/>
-              <a:t>7/30/20</a:t>
+              <a:t>7/30/2020</a:t>
             </a:fld>
             <a:endParaRPr lang="en-US" dirty="0"/>
           </a:p>
@@ -3525,7 +3525,7 @@
             <a:fld id="{B61BEF0D-F0BB-DE4B-95CE-6DB70DBA9567}" type="datetimeFigureOut">
               <a:rPr lang="en-US" smtClean="0"/>
               <a:pPr/>
-              <a:t>7/30/20</a:t>
+              <a:t>7/30/2020</a:t>
             </a:fld>
             <a:endParaRPr lang="en-US" dirty="0"/>
           </a:p>
@@ -3737,7 +3737,7 @@
             <a:fld id="{B61BEF0D-F0BB-DE4B-95CE-6DB70DBA9567}" type="datetimeFigureOut">
               <a:rPr lang="en-US" smtClean="0"/>
               <a:pPr/>
-              <a:t>7/30/20</a:t>
+              <a:t>7/30/2020</a:t>
             </a:fld>
             <a:endParaRPr lang="en-US" dirty="0"/>
           </a:p>
@@ -3939,7 +3939,7 @@
             <a:fld id="{B61BEF0D-F0BB-DE4B-95CE-6DB70DBA9567}" type="datetimeFigureOut">
               <a:rPr lang="en-US" smtClean="0"/>
               <a:pPr/>
-              <a:t>7/30/20</a:t>
+              <a:t>7/30/2020</a:t>
             </a:fld>
             <a:endParaRPr lang="en-US" dirty="0"/>
           </a:p>
@@ -4217,7 +4217,7 @@
             <a:fld id="{B61BEF0D-F0BB-DE4B-95CE-6DB70DBA9567}" type="datetimeFigureOut">
               <a:rPr lang="en-US" smtClean="0"/>
               <a:pPr/>
-              <a:t>7/30/20</a:t>
+              <a:t>7/30/2020</a:t>
             </a:fld>
             <a:endParaRPr lang="en-US" dirty="0"/>
           </a:p>
@@ -4485,7 +4485,7 @@
             <a:fld id="{B61BEF0D-F0BB-DE4B-95CE-6DB70DBA9567}" type="datetimeFigureOut">
               <a:rPr lang="en-US" smtClean="0"/>
               <a:pPr/>
-              <a:t>7/30/20</a:t>
+              <a:t>7/30/2020</a:t>
             </a:fld>
             <a:endParaRPr lang="en-US" dirty="0"/>
           </a:p>
@@ -4866,7 +4866,7 @@
             <a:fld id="{B61BEF0D-F0BB-DE4B-95CE-6DB70DBA9567}" type="datetimeFigureOut">
               <a:rPr lang="en-US" smtClean="0"/>
               <a:pPr/>
-              <a:t>7/30/20</a:t>
+              <a:t>7/30/2020</a:t>
             </a:fld>
             <a:endParaRPr lang="en-US" dirty="0"/>
           </a:p>
@@ -5016,7 +5016,7 @@
             <a:fld id="{B61BEF0D-F0BB-DE4B-95CE-6DB70DBA9567}" type="datetimeFigureOut">
               <a:rPr lang="en-US" smtClean="0"/>
               <a:pPr/>
-              <a:t>7/30/20</a:t>
+              <a:t>7/30/2020</a:t>
             </a:fld>
             <a:endParaRPr lang="en-US" dirty="0"/>
           </a:p>
@@ -5143,7 +5143,7 @@
             <a:fld id="{B61BEF0D-F0BB-DE4B-95CE-6DB70DBA9567}" type="datetimeFigureOut">
               <a:rPr lang="en-US" smtClean="0"/>
               <a:pPr/>
-              <a:t>7/30/20</a:t>
+              <a:t>7/30/2020</a:t>
             </a:fld>
             <a:endParaRPr lang="en-US" dirty="0"/>
           </a:p>
@@ -5430,7 +5430,7 @@
             <a:fld id="{B61BEF0D-F0BB-DE4B-95CE-6DB70DBA9567}" type="datetimeFigureOut">
               <a:rPr lang="en-US" smtClean="0"/>
               <a:pPr/>
-              <a:t>7/30/20</a:t>
+              <a:t>7/30/2020</a:t>
             </a:fld>
             <a:endParaRPr lang="en-US" dirty="0"/>
           </a:p>
@@ -5760,7 +5760,7 @@
             <a:fld id="{B61BEF0D-F0BB-DE4B-95CE-6DB70DBA9567}" type="datetimeFigureOut">
               <a:rPr lang="en-US" smtClean="0"/>
               <a:pPr/>
-              <a:t>7/30/20</a:t>
+              <a:t>7/30/2020</a:t>
             </a:fld>
             <a:endParaRPr lang="en-US" dirty="0"/>
           </a:p>
@@ -5976,7 +5976,7 @@
             <a:fld id="{B61BEF0D-F0BB-DE4B-95CE-6DB70DBA9567}" type="datetimeFigureOut">
               <a:rPr lang="en-US" smtClean="0"/>
               <a:pPr/>
-              <a:t>7/30/20</a:t>
+              <a:t>7/30/2020</a:t>
             </a:fld>
             <a:endParaRPr lang="en-US" dirty="0"/>
           </a:p>
@@ -7564,21 +7564,7 @@
           <a:p>
             <a:r>
               <a:rPr lang="en-US" sz="2400" dirty="0"/>
-              <a:t>One of two ways: </a:t>
-            </a:r>
-          </a:p>
-          <a:p>
-            <a:pPr lvl="1"/>
-            <a:r>
-              <a:rPr lang="en-US" sz="2400" dirty="0"/>
-              <a:t>Further research into why obesity is prevalent</a:t>
-            </a:r>
-          </a:p>
-          <a:p>
-            <a:pPr lvl="1"/>
-            <a:r>
-              <a:rPr lang="en-US" sz="2400" dirty="0"/>
-              <a:t>Further research into how smoking and alcohol are not as prevalent </a:t>
+              <a:t>Look further into why obesity is prevalent</a:t>
             </a:r>
           </a:p>
           <a:p>

</xml_diff>

<commit_message>
Updating images in powerpoint
</commit_message>
<xml_diff>
--- a/Project_One_BTTV.pptx
+++ b/Project_One_BTTV.pptx
@@ -5,7 +5,7 @@
     <p:sldMasterId id="2147484440" r:id="rId1"/>
   </p:sldMasterIdLst>
   <p:notesMasterIdLst>
-    <p:notesMasterId r:id="rId17"/>
+    <p:notesMasterId r:id="rId18"/>
   </p:notesMasterIdLst>
   <p:sldIdLst>
     <p:sldId id="256" r:id="rId2"/>
@@ -18,11 +18,12 @@
     <p:sldId id="261" r:id="rId9"/>
     <p:sldId id="271" r:id="rId10"/>
     <p:sldId id="272" r:id="rId11"/>
-    <p:sldId id="262" r:id="rId12"/>
-    <p:sldId id="263" r:id="rId13"/>
-    <p:sldId id="267" r:id="rId14"/>
-    <p:sldId id="268" r:id="rId15"/>
-    <p:sldId id="270" r:id="rId16"/>
+    <p:sldId id="273" r:id="rId12"/>
+    <p:sldId id="262" r:id="rId13"/>
+    <p:sldId id="263" r:id="rId14"/>
+    <p:sldId id="267" r:id="rId15"/>
+    <p:sldId id="268" r:id="rId16"/>
+    <p:sldId id="270" r:id="rId17"/>
   </p:sldIdLst>
   <p:sldSz cx="12192000" cy="6858000"/>
   <p:notesSz cx="6858000" cy="9144000"/>
@@ -6749,10 +6750,10 @@
       </p:sp>
       <p:grpSp>
         <p:nvGrpSpPr>
-          <p:cNvPr id="7" name="Group 6">
+          <p:cNvPr id="6" name="Group 5">
             <a:extLst>
               <a:ext uri="{FF2B5EF4-FFF2-40B4-BE49-F238E27FC236}">
-                <a16:creationId xmlns:a16="http://schemas.microsoft.com/office/drawing/2014/main" id="{A9D5FAFA-EC7F-4FBF-93FF-19327FA60154}"/>
+                <a16:creationId xmlns:a16="http://schemas.microsoft.com/office/drawing/2014/main" id="{29927362-4E97-4505-BFD7-5769F5D15A75}"/>
               </a:ext>
             </a:extLst>
           </p:cNvPr>
@@ -6788,8 +6789,8 @@
           </p:blipFill>
           <p:spPr bwMode="auto">
             <a:xfrm>
-              <a:off x="6550582" y="645517"/>
-              <a:ext cx="4348633" cy="3738165"/>
+              <a:off x="6550583" y="645517"/>
+              <a:ext cx="4348631" cy="3738165"/>
             </a:xfrm>
             <a:prstGeom prst="roundRect">
               <a:avLst>
@@ -6884,10 +6885,10 @@
       </p:grpSp>
       <p:grpSp>
         <p:nvGrpSpPr>
-          <p:cNvPr id="4" name="Group 3">
+          <p:cNvPr id="5" name="Group 4">
             <a:extLst>
               <a:ext uri="{FF2B5EF4-FFF2-40B4-BE49-F238E27FC236}">
-                <a16:creationId xmlns:a16="http://schemas.microsoft.com/office/drawing/2014/main" id="{6CAC4387-D048-4A34-9F53-1F252B84950F}"/>
+                <a16:creationId xmlns:a16="http://schemas.microsoft.com/office/drawing/2014/main" id="{4DADC2A8-9BBB-4D8D-BCA3-BD0583744CBF}"/>
               </a:ext>
             </a:extLst>
           </p:cNvPr>
@@ -6923,8 +6924,8 @@
           </p:blipFill>
           <p:spPr>
             <a:xfrm>
-              <a:off x="1290665" y="645517"/>
-              <a:ext cx="4348633" cy="3738165"/>
+              <a:off x="1290666" y="645517"/>
+              <a:ext cx="4348631" cy="3738165"/>
             </a:xfrm>
             <a:prstGeom prst="roundRect">
               <a:avLst>
@@ -7061,7 +7062,7 @@
                                           </p:stCondLst>
                                         </p:cTn>
                                         <p:tgtEl>
-                                          <p:spTgt spid="7"/>
+                                          <p:spTgt spid="6"/>
                                         </p:tgtEl>
                                         <p:attrNameLst>
                                           <p:attrName>style.visibility</p:attrName>
@@ -7106,7 +7107,7 @@
                                           </p:stCondLst>
                                         </p:cTn>
                                         <p:tgtEl>
-                                          <p:spTgt spid="4"/>
+                                          <p:spTgt spid="5"/>
                                         </p:tgtEl>
                                         <p:attrNameLst>
                                           <p:attrName>style.visibility</p:attrName>
@@ -7172,7 +7173,7 @@
           <p:cNvPr id="2" name="Title 1">
             <a:extLst>
               <a:ext uri="{FF2B5EF4-FFF2-40B4-BE49-F238E27FC236}">
-                <a16:creationId xmlns:a16="http://schemas.microsoft.com/office/drawing/2014/main" id="{8F5030D4-362E-7B40-93DC-35E66361608C}"/>
+                <a16:creationId xmlns:a16="http://schemas.microsoft.com/office/drawing/2014/main" id="{C22672AD-286D-3B4D-8E2F-0ECA4E90C60E}"/>
               </a:ext>
             </a:extLst>
           </p:cNvPr>
@@ -7185,100 +7186,465 @@
         </p:nvSpPr>
         <p:spPr>
           <a:xfrm>
-            <a:off x="1030287" y="95250"/>
-            <a:ext cx="10131425" cy="1456267"/>
+            <a:off x="1032933" y="4534958"/>
+            <a:ext cx="10127192" cy="931340"/>
           </a:xfrm>
         </p:spPr>
         <p:txBody>
-          <a:bodyPr/>
+          <a:bodyPr vert="horz" lIns="91440" tIns="45720" rIns="91440" bIns="45720" rtlCol="0" anchor="b">
+            <a:normAutofit/>
+          </a:bodyPr>
           <a:lstStyle/>
           <a:p>
-            <a:pPr algn="ctr"/>
+            <a:pPr algn="r"/>
             <a:r>
               <a:rPr lang="en-US" sz="4000" dirty="0"/>
-              <a:t>Cancer – obesity </a:t>
-            </a:r>
-            <a:r>
-              <a:rPr lang="en-US" sz="2800" dirty="0"/>
-              <a:t>(Valerie)</a:t>
-            </a:r>
-          </a:p>
-        </p:txBody>
-      </p:sp>
-      <p:pic>
-        <p:nvPicPr>
-          <p:cNvPr id="5" name="Content Placeholder 4" descr="A close up of a map&#10;&#10;Description automatically generated">
+              <a:t>Cancer – census data (tawny)</a:t>
+            </a:r>
+          </a:p>
+        </p:txBody>
+      </p:sp>
+      <p:sp>
+        <p:nvSpPr>
+          <p:cNvPr id="3" name="Content Placeholder 2">
             <a:extLst>
               <a:ext uri="{FF2B5EF4-FFF2-40B4-BE49-F238E27FC236}">
-                <a16:creationId xmlns:a16="http://schemas.microsoft.com/office/drawing/2014/main" id="{BF651B1C-7390-6E4D-B9F0-A6AA1B074C06}"/>
+                <a16:creationId xmlns:a16="http://schemas.microsoft.com/office/drawing/2014/main" id="{A32A483F-5485-E84B-8E8D-4070B28DE0AA}"/>
               </a:ext>
             </a:extLst>
           </p:cNvPr>
-          <p:cNvPicPr>
-            <a:picLocks noGrp="1" noChangeAspect="1"/>
-          </p:cNvPicPr>
+          <p:cNvSpPr>
+            <a:spLocks noGrp="1"/>
+          </p:cNvSpPr>
           <p:nvPr>
             <p:ph idx="1"/>
           </p:nvPr>
-        </p:nvPicPr>
-        <p:blipFill>
-          <a:blip r:embed="rId2"/>
-          <a:stretch>
-            <a:fillRect/>
-          </a:stretch>
-        </p:blipFill>
+        </p:nvSpPr>
         <p:spPr>
           <a:xfrm>
-            <a:off x="2819475" y="1551517"/>
-            <a:ext cx="6553047" cy="4368698"/>
+            <a:off x="2788920" y="5469474"/>
+            <a:ext cx="8371205" cy="397926"/>
           </a:xfrm>
         </p:spPr>
-      </p:pic>
-      <p:sp>
-        <p:nvSpPr>
-          <p:cNvPr id="3" name="TextBox 2">
+        <p:txBody>
+          <a:bodyPr vert="horz" lIns="91440" tIns="45720" rIns="91440" bIns="45720" rtlCol="0" anchor="t">
+            <a:normAutofit/>
+          </a:bodyPr>
+          <a:lstStyle/>
+          <a:p>
+            <a:pPr marL="0" indent="0" algn="r">
+              <a:lnSpc>
+                <a:spcPct val="90000"/>
+              </a:lnSpc>
+              <a:buNone/>
+            </a:pPr>
+            <a:r>
+              <a:rPr lang="en-US" sz="1200" cap="all" dirty="0"/>
+              <a:t>By County - The WEAKEST correlation between deaths* and census data was median AGE</a:t>
+            </a:r>
+          </a:p>
+        </p:txBody>
+      </p:sp>
+      <p:grpSp>
+        <p:nvGrpSpPr>
+          <p:cNvPr id="5" name="Group 4">
             <a:extLst>
               <a:ext uri="{FF2B5EF4-FFF2-40B4-BE49-F238E27FC236}">
-                <a16:creationId xmlns:a16="http://schemas.microsoft.com/office/drawing/2014/main" id="{0A1E8D84-CF41-DB4C-BC7C-03021CD6273C}"/>
+                <a16:creationId xmlns:a16="http://schemas.microsoft.com/office/drawing/2014/main" id="{2AF01347-EBAC-4045-A3DB-26F2A85B22AE}"/>
               </a:ext>
             </a:extLst>
           </p:cNvPr>
-          <p:cNvSpPr txBox="1"/>
+          <p:cNvGrpSpPr/>
           <p:nvPr/>
-        </p:nvSpPr>
-        <p:spPr>
-          <a:xfrm>
-            <a:off x="4582699" y="5920215"/>
-            <a:ext cx="2981714" cy="369332"/>
-          </a:xfrm>
-          <a:prstGeom prst="rect">
-            <a:avLst/>
-          </a:prstGeom>
-          <a:noFill/>
-        </p:spPr>
-        <p:txBody>
-          <a:bodyPr wrap="none" rtlCol="0">
-            <a:spAutoFit/>
-          </a:bodyPr>
-          <a:lstStyle/>
-          <a:p>
-            <a:r>
-              <a:rPr lang="en-US" dirty="0"/>
-              <a:t>r value: 0.8075564184676005</a:t>
-            </a:r>
-          </a:p>
-        </p:txBody>
-      </p:sp>
+        </p:nvGrpSpPr>
+        <p:grpSpPr>
+          <a:xfrm>
+            <a:off x="6512113" y="198632"/>
+            <a:ext cx="4541821" cy="4193157"/>
+            <a:chOff x="6512113" y="198632"/>
+            <a:chExt cx="4541821" cy="4193157"/>
+          </a:xfrm>
+        </p:grpSpPr>
+        <p:pic>
+          <p:nvPicPr>
+            <p:cNvPr id="1026" name="Picture 2">
+              <a:extLst>
+                <a:ext uri="{FF2B5EF4-FFF2-40B4-BE49-F238E27FC236}">
+                  <a16:creationId xmlns:a16="http://schemas.microsoft.com/office/drawing/2014/main" id="{6426ABC8-1864-44B6-9AC6-0A7E31053EC4}"/>
+                </a:ext>
+              </a:extLst>
+            </p:cNvPr>
+            <p:cNvPicPr>
+              <a:picLocks noChangeAspect="1" noChangeArrowheads="1"/>
+            </p:cNvPicPr>
+            <p:nvPr/>
+          </p:nvPicPr>
+          <p:blipFill>
+            <a:blip r:embed="rId2"/>
+            <a:srcRect/>
+            <a:stretch/>
+          </p:blipFill>
+          <p:spPr bwMode="auto">
+            <a:xfrm>
+              <a:off x="6550582" y="682241"/>
+              <a:ext cx="4457442" cy="3709548"/>
+            </a:xfrm>
+            <a:prstGeom prst="roundRect">
+              <a:avLst>
+                <a:gd name="adj" fmla="val 4380"/>
+              </a:avLst>
+            </a:prstGeom>
+            <a:solidFill>
+              <a:srgbClr val="FFFFFF">
+                <a:shade val="85000"/>
+              </a:srgbClr>
+            </a:solidFill>
+            <a:ln w="50800" cap="sq" cmpd="dbl">
+              <a:gradFill flip="none" rotWithShape="1">
+                <a:gsLst>
+                  <a:gs pos="0">
+                    <a:srgbClr val="FFFFFF"/>
+                  </a:gs>
+                  <a:gs pos="100000">
+                    <a:schemeClr val="tx1">
+                      <a:alpha val="0"/>
+                    </a:schemeClr>
+                  </a:gs>
+                </a:gsLst>
+                <a:path path="circle">
+                  <a:fillToRect l="50000" t="50000" r="50000" b="50000"/>
+                </a:path>
+                <a:tileRect/>
+              </a:gradFill>
+              <a:miter lim="800000"/>
+            </a:ln>
+            <a:effectLst>
+              <a:outerShdw blurRad="254000" algn="tl" rotWithShape="0">
+                <a:srgbClr val="000000">
+                  <a:alpha val="43000"/>
+                </a:srgbClr>
+              </a:outerShdw>
+            </a:effectLst>
+            <a:scene3d>
+              <a:camera prst="orthographicFront"/>
+              <a:lightRig rig="twoPt" dir="t">
+                <a:rot lat="0" lon="0" rev="7200000"/>
+              </a:lightRig>
+            </a:scene3d>
+            <a:sp3d>
+              <a:bevelT w="25400" h="19050"/>
+              <a:contourClr>
+                <a:srgbClr val="FFFFFF"/>
+              </a:contourClr>
+            </a:sp3d>
+          </p:spPr>
+        </p:pic>
+        <p:sp>
+          <p:nvSpPr>
+            <p:cNvPr id="13" name="TextBox 12">
+              <a:extLst>
+                <a:ext uri="{FF2B5EF4-FFF2-40B4-BE49-F238E27FC236}">
+                  <a16:creationId xmlns:a16="http://schemas.microsoft.com/office/drawing/2014/main" id="{B1D0A302-9402-4187-B5F5-58284C24A134}"/>
+                </a:ext>
+              </a:extLst>
+            </p:cNvPr>
+            <p:cNvSpPr txBox="1"/>
+            <p:nvPr/>
+          </p:nvSpPr>
+          <p:spPr>
+            <a:xfrm>
+              <a:off x="6512113" y="198632"/>
+              <a:ext cx="4541821" cy="307777"/>
+            </a:xfrm>
+            <a:prstGeom prst="rect">
+              <a:avLst/>
+            </a:prstGeom>
+            <a:noFill/>
+          </p:spPr>
+          <p:txBody>
+            <a:bodyPr wrap="none" rtlCol="0">
+              <a:spAutoFit/>
+            </a:bodyPr>
+            <a:lstStyle/>
+            <a:p>
+              <a:pPr>
+                <a:spcAft>
+                  <a:spcPts val="600"/>
+                </a:spcAft>
+              </a:pPr>
+              <a:r>
+                <a:rPr lang="en-US" sz="1400" dirty="0"/>
+                <a:t>The correlation between death rate and no insurance is 0.24</a:t>
+              </a:r>
+            </a:p>
+          </p:txBody>
+        </p:sp>
+      </p:grpSp>
+      <p:grpSp>
+        <p:nvGrpSpPr>
+          <p:cNvPr id="6" name="Group 5">
+            <a:extLst>
+              <a:ext uri="{FF2B5EF4-FFF2-40B4-BE49-F238E27FC236}">
+                <a16:creationId xmlns:a16="http://schemas.microsoft.com/office/drawing/2014/main" id="{7EFF70A7-8546-43C7-8ACD-84C575C59D9B}"/>
+              </a:ext>
+            </a:extLst>
+          </p:cNvPr>
+          <p:cNvGrpSpPr/>
+          <p:nvPr/>
+        </p:nvGrpSpPr>
+        <p:grpSpPr>
+          <a:xfrm>
+            <a:off x="1254317" y="182264"/>
+            <a:ext cx="4636397" cy="4179015"/>
+            <a:chOff x="1254317" y="182264"/>
+            <a:chExt cx="4636397" cy="4179015"/>
+          </a:xfrm>
+        </p:grpSpPr>
+        <p:pic>
+          <p:nvPicPr>
+            <p:cNvPr id="22" name="Picture 21">
+              <a:extLst>
+                <a:ext uri="{FF2B5EF4-FFF2-40B4-BE49-F238E27FC236}">
+                  <a16:creationId xmlns:a16="http://schemas.microsoft.com/office/drawing/2014/main" id="{6DD8BC8E-0603-451E-9253-83B674168D1D}"/>
+                </a:ext>
+              </a:extLst>
+            </p:cNvPr>
+            <p:cNvPicPr>
+              <a:picLocks noChangeAspect="1"/>
+            </p:cNvPicPr>
+            <p:nvPr/>
+          </p:nvPicPr>
+          <p:blipFill>
+            <a:blip r:embed="rId3"/>
+            <a:srcRect/>
+            <a:stretch/>
+          </p:blipFill>
+          <p:spPr>
+            <a:xfrm>
+              <a:off x="1290665" y="667920"/>
+              <a:ext cx="4348633" cy="3693359"/>
+            </a:xfrm>
+            <a:prstGeom prst="roundRect">
+              <a:avLst>
+                <a:gd name="adj" fmla="val 4380"/>
+              </a:avLst>
+            </a:prstGeom>
+            <a:solidFill>
+              <a:srgbClr val="FFFFFF">
+                <a:shade val="85000"/>
+              </a:srgbClr>
+            </a:solidFill>
+            <a:ln w="50800" cap="sq" cmpd="dbl">
+              <a:gradFill flip="none" rotWithShape="1">
+                <a:gsLst>
+                  <a:gs pos="0">
+                    <a:srgbClr val="FFFFFF"/>
+                  </a:gs>
+                  <a:gs pos="100000">
+                    <a:schemeClr val="tx1">
+                      <a:alpha val="0"/>
+                    </a:schemeClr>
+                  </a:gs>
+                </a:gsLst>
+                <a:path path="circle">
+                  <a:fillToRect l="50000" t="50000" r="50000" b="50000"/>
+                </a:path>
+                <a:tileRect/>
+              </a:gradFill>
+              <a:miter lim="800000"/>
+            </a:ln>
+            <a:effectLst>
+              <a:outerShdw blurRad="254000" algn="tl" rotWithShape="0">
+                <a:srgbClr val="000000">
+                  <a:alpha val="43000"/>
+                </a:srgbClr>
+              </a:outerShdw>
+            </a:effectLst>
+            <a:scene3d>
+              <a:camera prst="orthographicFront"/>
+              <a:lightRig rig="twoPt" dir="t">
+                <a:rot lat="0" lon="0" rev="7200000"/>
+              </a:lightRig>
+            </a:scene3d>
+            <a:sp3d>
+              <a:bevelT w="25400" h="19050"/>
+              <a:contourClr>
+                <a:srgbClr val="FFFFFF"/>
+              </a:contourClr>
+            </a:sp3d>
+          </p:spPr>
+        </p:pic>
+        <p:sp>
+          <p:nvSpPr>
+            <p:cNvPr id="20" name="TextBox 19">
+              <a:extLst>
+                <a:ext uri="{FF2B5EF4-FFF2-40B4-BE49-F238E27FC236}">
+                  <a16:creationId xmlns:a16="http://schemas.microsoft.com/office/drawing/2014/main" id="{23A95A4A-EABC-4A19-9800-BAF3B0631F19}"/>
+                </a:ext>
+              </a:extLst>
+            </p:cNvPr>
+            <p:cNvSpPr txBox="1"/>
+            <p:nvPr/>
+          </p:nvSpPr>
+          <p:spPr>
+            <a:xfrm>
+              <a:off x="1254317" y="182264"/>
+              <a:ext cx="4636397" cy="307777"/>
+            </a:xfrm>
+            <a:prstGeom prst="rect">
+              <a:avLst/>
+            </a:prstGeom>
+            <a:noFill/>
+          </p:spPr>
+          <p:txBody>
+            <a:bodyPr wrap="none" rtlCol="0">
+              <a:spAutoFit/>
+            </a:bodyPr>
+            <a:lstStyle/>
+            <a:p>
+              <a:pPr>
+                <a:spcAft>
+                  <a:spcPts val="600"/>
+                </a:spcAft>
+              </a:pPr>
+              <a:r>
+                <a:rPr lang="en-US" sz="1400" dirty="0"/>
+                <a:t>The correlation between death rate and no insurance is -0.05</a:t>
+              </a:r>
+            </a:p>
+          </p:txBody>
+        </p:sp>
+      </p:grpSp>
     </p:spTree>
     <p:extLst>
       <p:ext uri="{BB962C8B-B14F-4D97-AF65-F5344CB8AC3E}">
-        <p14:creationId xmlns:p14="http://schemas.microsoft.com/office/powerpoint/2010/main" val="4138844305"/>
+        <p14:creationId xmlns:p14="http://schemas.microsoft.com/office/powerpoint/2010/main" val="3008555039"/>
       </p:ext>
     </p:extLst>
   </p:cSld>
   <p:clrMapOvr>
     <a:masterClrMapping/>
   </p:clrMapOvr>
+  <p:timing>
+    <p:tnLst>
+      <p:par>
+        <p:cTn id="1" dur="indefinite" restart="never" nodeType="tmRoot">
+          <p:childTnLst>
+            <p:seq concurrent="1" nextAc="seek">
+              <p:cTn id="2" dur="indefinite" nodeType="mainSeq">
+                <p:childTnLst>
+                  <p:par>
+                    <p:cTn id="3" fill="hold">
+                      <p:stCondLst>
+                        <p:cond delay="indefinite"/>
+                      </p:stCondLst>
+                      <p:childTnLst>
+                        <p:par>
+                          <p:cTn id="4" fill="hold">
+                            <p:stCondLst>
+                              <p:cond delay="0"/>
+                            </p:stCondLst>
+                            <p:childTnLst>
+                              <p:par>
+                                <p:cTn id="5" presetID="1" presetClass="entr" presetSubtype="0" fill="hold" nodeType="clickEffect">
+                                  <p:stCondLst>
+                                    <p:cond delay="0"/>
+                                  </p:stCondLst>
+                                  <p:childTnLst>
+                                    <p:set>
+                                      <p:cBhvr>
+                                        <p:cTn id="6" dur="1" fill="hold">
+                                          <p:stCondLst>
+                                            <p:cond delay="0"/>
+                                          </p:stCondLst>
+                                        </p:cTn>
+                                        <p:tgtEl>
+                                          <p:spTgt spid="5"/>
+                                        </p:tgtEl>
+                                        <p:attrNameLst>
+                                          <p:attrName>style.visibility</p:attrName>
+                                        </p:attrNameLst>
+                                      </p:cBhvr>
+                                      <p:to>
+                                        <p:strVal val="visible"/>
+                                      </p:to>
+                                    </p:set>
+                                  </p:childTnLst>
+                                </p:cTn>
+                              </p:par>
+                            </p:childTnLst>
+                          </p:cTn>
+                        </p:par>
+                      </p:childTnLst>
+                    </p:cTn>
+                  </p:par>
+                  <p:par>
+                    <p:cTn id="7" fill="hold">
+                      <p:stCondLst>
+                        <p:cond delay="indefinite"/>
+                      </p:stCondLst>
+                      <p:childTnLst>
+                        <p:par>
+                          <p:cTn id="8" fill="hold">
+                            <p:stCondLst>
+                              <p:cond delay="0"/>
+                            </p:stCondLst>
+                            <p:childTnLst>
+                              <p:par>
+                                <p:cTn id="9" presetID="1" presetClass="entr" presetSubtype="0" fill="hold" nodeType="clickEffect">
+                                  <p:stCondLst>
+                                    <p:cond delay="0"/>
+                                  </p:stCondLst>
+                                  <p:childTnLst>
+                                    <p:set>
+                                      <p:cBhvr>
+                                        <p:cTn id="10" dur="1" fill="hold">
+                                          <p:stCondLst>
+                                            <p:cond delay="0"/>
+                                          </p:stCondLst>
+                                        </p:cTn>
+                                        <p:tgtEl>
+                                          <p:spTgt spid="6"/>
+                                        </p:tgtEl>
+                                        <p:attrNameLst>
+                                          <p:attrName>style.visibility</p:attrName>
+                                        </p:attrNameLst>
+                                      </p:cBhvr>
+                                      <p:to>
+                                        <p:strVal val="visible"/>
+                                      </p:to>
+                                    </p:set>
+                                  </p:childTnLst>
+                                </p:cTn>
+                              </p:par>
+                            </p:childTnLst>
+                          </p:cTn>
+                        </p:par>
+                      </p:childTnLst>
+                    </p:cTn>
+                  </p:par>
+                </p:childTnLst>
+              </p:cTn>
+              <p:prevCondLst>
+                <p:cond evt="onPrev" delay="0">
+                  <p:tgtEl>
+                    <p:sldTgt/>
+                  </p:tgtEl>
+                </p:cond>
+              </p:prevCondLst>
+              <p:nextCondLst>
+                <p:cond evt="onNext" delay="0">
+                  <p:tgtEl>
+                    <p:sldTgt/>
+                  </p:tgtEl>
+                </p:cond>
+              </p:nextCondLst>
+            </p:seq>
+          </p:childTnLst>
+        </p:cTn>
+      </p:par>
+    </p:tnLst>
+  </p:timing>
 </p:sld>
 </file>
 
@@ -7304,7 +7670,7 @@
           <p:cNvPr id="2" name="Title 1">
             <a:extLst>
               <a:ext uri="{FF2B5EF4-FFF2-40B4-BE49-F238E27FC236}">
-                <a16:creationId xmlns:a16="http://schemas.microsoft.com/office/drawing/2014/main" id="{2442D1D8-4C6A-D546-910B-6B844438D973}"/>
+                <a16:creationId xmlns:a16="http://schemas.microsoft.com/office/drawing/2014/main" id="{8F5030D4-362E-7B40-93DC-35E66361608C}"/>
               </a:ext>
             </a:extLst>
           </p:cNvPr>
@@ -7317,7 +7683,7 @@
         </p:nvSpPr>
         <p:spPr>
           <a:xfrm>
-            <a:off x="685800" y="146508"/>
+            <a:off x="1030287" y="95250"/>
             <a:ext cx="10131425" cy="1456267"/>
           </a:xfrm>
         </p:spPr>
@@ -7325,23 +7691,24 @@
           <a:bodyPr/>
           <a:lstStyle/>
           <a:p>
+            <a:pPr algn="ctr"/>
             <a:r>
               <a:rPr lang="en-US" sz="4000" dirty="0"/>
-              <a:t>Cancer – smoking </a:t>
+              <a:t>Cancer – obesity </a:t>
             </a:r>
             <a:r>
               <a:rPr lang="en-US" sz="2800" dirty="0"/>
-              <a:t>(trevor)</a:t>
+              <a:t>(Valerie)</a:t>
             </a:r>
           </a:p>
         </p:txBody>
       </p:sp>
       <p:pic>
         <p:nvPicPr>
-          <p:cNvPr id="4" name="Content Placeholder 3" descr="A screenshot of a cell phone&#10;&#10;Description automatically generated">
+          <p:cNvPr id="5" name="Content Placeholder 4" descr="A close up of a map&#10;&#10;Description automatically generated">
             <a:extLst>
               <a:ext uri="{FF2B5EF4-FFF2-40B4-BE49-F238E27FC236}">
-                <a16:creationId xmlns:a16="http://schemas.microsoft.com/office/drawing/2014/main" id="{A1A8A288-4026-7F45-9FC1-003E183CF64A}"/>
+                <a16:creationId xmlns:a16="http://schemas.microsoft.com/office/drawing/2014/main" id="{BF651B1C-7390-6E4D-B9F0-A6AA1B074C06}"/>
               </a:ext>
             </a:extLst>
           </p:cNvPr>
@@ -7360,18 +7727,50 @@
         </p:blipFill>
         <p:spPr>
           <a:xfrm>
-            <a:off x="2563882" y="1567430"/>
-            <a:ext cx="6375262" cy="4157514"/>
+            <a:off x="2819475" y="1551517"/>
+            <a:ext cx="6553047" cy="4368698"/>
+          </a:xfrm>
+        </p:spPr>
+      </p:pic>
+      <p:sp>
+        <p:nvSpPr>
+          <p:cNvPr id="3" name="TextBox 2">
+            <a:extLst>
+              <a:ext uri="{FF2B5EF4-FFF2-40B4-BE49-F238E27FC236}">
+                <a16:creationId xmlns:a16="http://schemas.microsoft.com/office/drawing/2014/main" id="{0A1E8D84-CF41-DB4C-BC7C-03021CD6273C}"/>
+              </a:ext>
+            </a:extLst>
+          </p:cNvPr>
+          <p:cNvSpPr txBox="1"/>
+          <p:nvPr/>
+        </p:nvSpPr>
+        <p:spPr>
+          <a:xfrm>
+            <a:off x="4582699" y="5920215"/>
+            <a:ext cx="2981714" cy="369332"/>
           </a:xfrm>
           <a:prstGeom prst="rect">
             <a:avLst/>
           </a:prstGeom>
+          <a:noFill/>
         </p:spPr>
-      </p:pic>
+        <p:txBody>
+          <a:bodyPr wrap="none" rtlCol="0">
+            <a:spAutoFit/>
+          </a:bodyPr>
+          <a:lstStyle/>
+          <a:p>
+            <a:r>
+              <a:rPr lang="en-US" dirty="0"/>
+              <a:t>r value: 0.8075564184676005</a:t>
+            </a:r>
+          </a:p>
+        </p:txBody>
+      </p:sp>
     </p:spTree>
     <p:extLst>
       <p:ext uri="{BB962C8B-B14F-4D97-AF65-F5344CB8AC3E}">
-        <p14:creationId xmlns:p14="http://schemas.microsoft.com/office/powerpoint/2010/main" val="2846826042"/>
+        <p14:creationId xmlns:p14="http://schemas.microsoft.com/office/powerpoint/2010/main" val="4138844305"/>
       </p:ext>
     </p:extLst>
   </p:cSld>
@@ -7403,7 +7802,7 @@
           <p:cNvPr id="2" name="Title 1">
             <a:extLst>
               <a:ext uri="{FF2B5EF4-FFF2-40B4-BE49-F238E27FC236}">
-                <a16:creationId xmlns:a16="http://schemas.microsoft.com/office/drawing/2014/main" id="{ED19FC3C-6080-4D42-AD97-7BB1178554E7}"/>
+                <a16:creationId xmlns:a16="http://schemas.microsoft.com/office/drawing/2014/main" id="{2442D1D8-4C6A-D546-910B-6B844438D973}"/>
               </a:ext>
             </a:extLst>
           </p:cNvPr>
@@ -7414,72 +7813,63 @@
             <p:ph type="title"/>
           </p:nvPr>
         </p:nvSpPr>
-        <p:spPr/>
-        <p:txBody>
-          <a:bodyPr>
-            <a:normAutofit/>
-          </a:bodyPr>
+        <p:spPr>
+          <a:xfrm>
+            <a:off x="685800" y="146508"/>
+            <a:ext cx="10131425" cy="1456267"/>
+          </a:xfrm>
+        </p:spPr>
+        <p:txBody>
+          <a:bodyPr/>
           <a:lstStyle/>
           <a:p>
             <a:r>
               <a:rPr lang="en-US" sz="4000" dirty="0"/>
-              <a:t>Conclusions / Summary</a:t>
-            </a:r>
-          </a:p>
-        </p:txBody>
-      </p:sp>
-      <p:sp>
-        <p:nvSpPr>
-          <p:cNvPr id="3" name="Content Placeholder 2">
+              <a:t>Cancer – smoking </a:t>
+            </a:r>
+            <a:r>
+              <a:rPr lang="en-US" sz="2800" dirty="0"/>
+              <a:t>(trevor)</a:t>
+            </a:r>
+          </a:p>
+        </p:txBody>
+      </p:sp>
+      <p:pic>
+        <p:nvPicPr>
+          <p:cNvPr id="4" name="Content Placeholder 3" descr="A screenshot of a cell phone&#10;&#10;Description automatically generated">
             <a:extLst>
               <a:ext uri="{FF2B5EF4-FFF2-40B4-BE49-F238E27FC236}">
-                <a16:creationId xmlns:a16="http://schemas.microsoft.com/office/drawing/2014/main" id="{139100DE-8DD7-C247-90C3-CD4101963B83}"/>
+                <a16:creationId xmlns:a16="http://schemas.microsoft.com/office/drawing/2014/main" id="{A1A8A288-4026-7F45-9FC1-003E183CF64A}"/>
               </a:ext>
             </a:extLst>
           </p:cNvPr>
-          <p:cNvSpPr>
-            <a:spLocks noGrp="1"/>
-          </p:cNvSpPr>
+          <p:cNvPicPr>
+            <a:picLocks noGrp="1" noChangeAspect="1"/>
+          </p:cNvPicPr>
           <p:nvPr>
             <p:ph idx="1"/>
           </p:nvPr>
-        </p:nvSpPr>
-        <p:spPr/>
-        <p:txBody>
-          <a:bodyPr>
-            <a:normAutofit/>
-          </a:bodyPr>
-          <a:lstStyle/>
-          <a:p>
-            <a:r>
-              <a:rPr lang="en-US" sz="2800" dirty="0"/>
-              <a:t>Lower prevalence of alcohol and smoking correlations to cancer than expected</a:t>
-            </a:r>
-          </a:p>
-          <a:p>
-            <a:r>
-              <a:rPr lang="en-US" sz="2800" dirty="0"/>
-              <a:t>Health insurance has no direct impact (Obamacare)</a:t>
-            </a:r>
-          </a:p>
-          <a:p>
-            <a:r>
-              <a:rPr lang="en-US" sz="2800" dirty="0"/>
-              <a:t>Higher correlation of obesity in cancer death rate across the nation</a:t>
-            </a:r>
-          </a:p>
-          <a:p>
-            <a:pPr marL="0" indent="0">
-              <a:buNone/>
-            </a:pPr>
-            <a:endParaRPr lang="en-US" sz="2800" dirty="0"/>
-          </a:p>
-        </p:txBody>
-      </p:sp>
+        </p:nvPicPr>
+        <p:blipFill>
+          <a:blip r:embed="rId2"/>
+          <a:stretch>
+            <a:fillRect/>
+          </a:stretch>
+        </p:blipFill>
+        <p:spPr>
+          <a:xfrm>
+            <a:off x="2563882" y="1567430"/>
+            <a:ext cx="6375262" cy="4157514"/>
+          </a:xfrm>
+          <a:prstGeom prst="rect">
+            <a:avLst/>
+          </a:prstGeom>
+        </p:spPr>
+      </p:pic>
     </p:spTree>
     <p:extLst>
       <p:ext uri="{BB962C8B-B14F-4D97-AF65-F5344CB8AC3E}">
-        <p14:creationId xmlns:p14="http://schemas.microsoft.com/office/powerpoint/2010/main" val="56598581"/>
+        <p14:creationId xmlns:p14="http://schemas.microsoft.com/office/powerpoint/2010/main" val="2846826042"/>
       </p:ext>
     </p:extLst>
   </p:cSld>
@@ -7511,6 +7901,114 @@
           <p:cNvPr id="2" name="Title 1">
             <a:extLst>
               <a:ext uri="{FF2B5EF4-FFF2-40B4-BE49-F238E27FC236}">
+                <a16:creationId xmlns:a16="http://schemas.microsoft.com/office/drawing/2014/main" id="{ED19FC3C-6080-4D42-AD97-7BB1178554E7}"/>
+              </a:ext>
+            </a:extLst>
+          </p:cNvPr>
+          <p:cNvSpPr>
+            <a:spLocks noGrp="1"/>
+          </p:cNvSpPr>
+          <p:nvPr>
+            <p:ph type="title"/>
+          </p:nvPr>
+        </p:nvSpPr>
+        <p:spPr/>
+        <p:txBody>
+          <a:bodyPr>
+            <a:normAutofit/>
+          </a:bodyPr>
+          <a:lstStyle/>
+          <a:p>
+            <a:r>
+              <a:rPr lang="en-US" sz="4000" dirty="0"/>
+              <a:t>Conclusions / Summary</a:t>
+            </a:r>
+          </a:p>
+        </p:txBody>
+      </p:sp>
+      <p:sp>
+        <p:nvSpPr>
+          <p:cNvPr id="3" name="Content Placeholder 2">
+            <a:extLst>
+              <a:ext uri="{FF2B5EF4-FFF2-40B4-BE49-F238E27FC236}">
+                <a16:creationId xmlns:a16="http://schemas.microsoft.com/office/drawing/2014/main" id="{139100DE-8DD7-C247-90C3-CD4101963B83}"/>
+              </a:ext>
+            </a:extLst>
+          </p:cNvPr>
+          <p:cNvSpPr>
+            <a:spLocks noGrp="1"/>
+          </p:cNvSpPr>
+          <p:nvPr>
+            <p:ph idx="1"/>
+          </p:nvPr>
+        </p:nvSpPr>
+        <p:spPr/>
+        <p:txBody>
+          <a:bodyPr>
+            <a:normAutofit/>
+          </a:bodyPr>
+          <a:lstStyle/>
+          <a:p>
+            <a:r>
+              <a:rPr lang="en-US" sz="2800" dirty="0"/>
+              <a:t>Lower prevalence of alcohol and smoking correlations to cancer than expected</a:t>
+            </a:r>
+          </a:p>
+          <a:p>
+            <a:r>
+              <a:rPr lang="en-US" sz="2800" dirty="0"/>
+              <a:t>Health insurance has no direct impact (Obamacare)</a:t>
+            </a:r>
+          </a:p>
+          <a:p>
+            <a:r>
+              <a:rPr lang="en-US" sz="2800" dirty="0"/>
+              <a:t>Higher correlation of obesity in cancer death rate across the nation</a:t>
+            </a:r>
+          </a:p>
+          <a:p>
+            <a:pPr marL="0" indent="0">
+              <a:buNone/>
+            </a:pPr>
+            <a:endParaRPr lang="en-US" sz="2800" dirty="0"/>
+          </a:p>
+        </p:txBody>
+      </p:sp>
+    </p:spTree>
+    <p:extLst>
+      <p:ext uri="{BB962C8B-B14F-4D97-AF65-F5344CB8AC3E}">
+        <p14:creationId xmlns:p14="http://schemas.microsoft.com/office/powerpoint/2010/main" val="56598581"/>
+      </p:ext>
+    </p:extLst>
+  </p:cSld>
+  <p:clrMapOvr>
+    <a:masterClrMapping/>
+  </p:clrMapOvr>
+</p:sld>
+</file>
+
+<file path=ppt/slides/slide15.xml><?xml version="1.0" encoding="utf-8"?>
+<p:sld xmlns:a="http://schemas.openxmlformats.org/drawingml/2006/main" xmlns:r="http://schemas.openxmlformats.org/officeDocument/2006/relationships" xmlns:p="http://schemas.openxmlformats.org/presentationml/2006/main">
+  <p:cSld>
+    <p:spTree>
+      <p:nvGrpSpPr>
+        <p:cNvPr id="1" name=""/>
+        <p:cNvGrpSpPr/>
+        <p:nvPr/>
+      </p:nvGrpSpPr>
+      <p:grpSpPr>
+        <a:xfrm>
+          <a:off x="0" y="0"/>
+          <a:ext cx="0" cy="0"/>
+          <a:chOff x="0" y="0"/>
+          <a:chExt cx="0" cy="0"/>
+        </a:xfrm>
+      </p:grpSpPr>
+      <p:sp>
+        <p:nvSpPr>
+          <p:cNvPr id="2" name="Title 1">
+            <a:extLst>
+              <a:ext uri="{FF2B5EF4-FFF2-40B4-BE49-F238E27FC236}">
                 <a16:creationId xmlns:a16="http://schemas.microsoft.com/office/drawing/2014/main" id="{01B34777-B502-F246-A2C1-C82C2A67E757}"/>
               </a:ext>
             </a:extLst>
@@ -7597,7 +8095,7 @@
 </p:sld>
 </file>
 
-<file path=ppt/slides/slide15.xml><?xml version="1.0" encoding="utf-8"?>
+<file path=ppt/slides/slide16.xml><?xml version="1.0" encoding="utf-8"?>
 <p:sld xmlns:a="http://schemas.openxmlformats.org/drawingml/2006/main" xmlns:r="http://schemas.openxmlformats.org/officeDocument/2006/relationships" xmlns:p="http://schemas.openxmlformats.org/presentationml/2006/main">
   <p:cSld>
     <p:spTree>
@@ -9630,10 +10128,10 @@
       </p:sp>
       <p:grpSp>
         <p:nvGrpSpPr>
-          <p:cNvPr id="4" name="Group 3">
+          <p:cNvPr id="5" name="Group 4">
             <a:extLst>
               <a:ext uri="{FF2B5EF4-FFF2-40B4-BE49-F238E27FC236}">
-                <a16:creationId xmlns:a16="http://schemas.microsoft.com/office/drawing/2014/main" id="{B8F71BB5-4C8D-41A9-A0E2-0B322D6C1245}"/>
+                <a16:creationId xmlns:a16="http://schemas.microsoft.com/office/drawing/2014/main" id="{550C8AB9-348A-49EE-8208-C660666606E7}"/>
               </a:ext>
             </a:extLst>
           </p:cNvPr>
@@ -9643,9 +10141,9 @@
         <p:grpSpPr>
           <a:xfrm>
             <a:off x="6097588" y="198632"/>
-            <a:ext cx="5937138" cy="4185051"/>
+            <a:ext cx="5637249" cy="4185050"/>
             <a:chOff x="6097588" y="198632"/>
-            <a:chExt cx="5937138" cy="4185051"/>
+            <a:chExt cx="5637249" cy="4185050"/>
           </a:xfrm>
         </p:grpSpPr>
         <p:pic>
@@ -9670,7 +10168,7 @@
           <p:spPr bwMode="auto">
             <a:xfrm>
               <a:off x="6362167" y="645517"/>
-              <a:ext cx="4725464" cy="3738166"/>
+              <a:ext cx="4725464" cy="3738165"/>
             </a:xfrm>
             <a:prstGeom prst="roundRect">
               <a:avLst>
@@ -9737,7 +10235,7 @@
           <p:spPr>
             <a:xfrm>
               <a:off x="6097588" y="198632"/>
-              <a:ext cx="5937138" cy="307777"/>
+              <a:ext cx="5637249" cy="307777"/>
             </a:xfrm>
             <a:prstGeom prst="rect">
               <a:avLst/>
@@ -9757,7 +10255,7 @@
               </a:pPr>
               <a:r>
                 <a:rPr lang="en-US" sz="1400" dirty="0"/>
-                <a:t>The correlation between death rate and median household income age is -0.63</a:t>
+                <a:t>The correlation between death rate and median household income is -0.63</a:t>
               </a:r>
             </a:p>
           </p:txBody>
@@ -9765,10 +10263,10 @@
       </p:grpSp>
       <p:grpSp>
         <p:nvGrpSpPr>
-          <p:cNvPr id="6" name="Group 5">
+          <p:cNvPr id="7" name="Group 6">
             <a:extLst>
               <a:ext uri="{FF2B5EF4-FFF2-40B4-BE49-F238E27FC236}">
-                <a16:creationId xmlns:a16="http://schemas.microsoft.com/office/drawing/2014/main" id="{4D23E747-576D-4851-93A1-90EB597EDCBF}"/>
+                <a16:creationId xmlns:a16="http://schemas.microsoft.com/office/drawing/2014/main" id="{B944A6BD-1403-4615-A0BF-1918E904773A}"/>
               </a:ext>
             </a:extLst>
           </p:cNvPr>
@@ -9778,9 +10276,9 @@
         <p:grpSpPr>
           <a:xfrm>
             <a:off x="322191" y="198632"/>
-            <a:ext cx="5937138" cy="4185050"/>
+            <a:ext cx="5677323" cy="4185050"/>
             <a:chOff x="322191" y="198632"/>
-            <a:chExt cx="5937138" cy="4185050"/>
+            <a:chExt cx="5677323" cy="4185050"/>
           </a:xfrm>
         </p:grpSpPr>
         <p:pic>
@@ -9805,7 +10303,7 @@
           <p:spPr>
             <a:xfrm>
               <a:off x="1102250" y="645517"/>
-              <a:ext cx="4725464" cy="3738165"/>
+              <a:ext cx="4725463" cy="3738165"/>
             </a:xfrm>
             <a:prstGeom prst="roundRect">
               <a:avLst>
@@ -9872,7 +10370,7 @@
           <p:spPr>
             <a:xfrm>
               <a:off x="322191" y="198632"/>
-              <a:ext cx="5937138" cy="307777"/>
+              <a:ext cx="5677323" cy="307777"/>
             </a:xfrm>
             <a:prstGeom prst="rect">
               <a:avLst/>
@@ -9892,7 +10390,7 @@
               </a:pPr>
               <a:r>
                 <a:rPr lang="en-US" sz="1400" dirty="0"/>
-                <a:t>The correlation between death rate and median household income age is -0.45</a:t>
+                <a:t>The correlation between death rate and median household income is -0.45</a:t>
               </a:r>
             </a:p>
           </p:txBody>
@@ -9942,7 +10440,7 @@
                                           </p:stCondLst>
                                         </p:cTn>
                                         <p:tgtEl>
-                                          <p:spTgt spid="4"/>
+                                          <p:spTgt spid="5"/>
                                         </p:tgtEl>
                                         <p:attrNameLst>
                                           <p:attrName>style.visibility</p:attrName>
@@ -9987,7 +10485,7 @@
                                           </p:stCondLst>
                                         </p:cTn>
                                         <p:tgtEl>
-                                          <p:spTgt spid="6"/>
+                                          <p:spTgt spid="7"/>
                                         </p:tgtEl>
                                         <p:attrNameLst>
                                           <p:attrName>style.visibility</p:attrName>

</xml_diff>

<commit_message>
Updating power point images
</commit_message>
<xml_diff>
--- a/Project_One_BTTV.pptx
+++ b/Project_One_BTTV.pptx
@@ -5,7 +5,7 @@
     <p:sldMasterId id="2147484440" r:id="rId1"/>
   </p:sldMasterIdLst>
   <p:notesMasterIdLst>
-    <p:notesMasterId r:id="rId18"/>
+    <p:notesMasterId r:id="rId17"/>
   </p:notesMasterIdLst>
   <p:sldIdLst>
     <p:sldId id="256" r:id="rId2"/>
@@ -18,12 +18,11 @@
     <p:sldId id="261" r:id="rId9"/>
     <p:sldId id="271" r:id="rId10"/>
     <p:sldId id="272" r:id="rId11"/>
-    <p:sldId id="273" r:id="rId12"/>
-    <p:sldId id="262" r:id="rId13"/>
-    <p:sldId id="263" r:id="rId14"/>
-    <p:sldId id="267" r:id="rId15"/>
-    <p:sldId id="268" r:id="rId16"/>
-    <p:sldId id="270" r:id="rId17"/>
+    <p:sldId id="262" r:id="rId12"/>
+    <p:sldId id="263" r:id="rId13"/>
+    <p:sldId id="267" r:id="rId14"/>
+    <p:sldId id="268" r:id="rId15"/>
+    <p:sldId id="270" r:id="rId16"/>
   </p:sldIdLst>
   <p:sldSz cx="12192000" cy="6858000"/>
   <p:notesSz cx="6858000" cy="9144000"/>
@@ -7173,7 +7172,7 @@
           <p:cNvPr id="2" name="Title 1">
             <a:extLst>
               <a:ext uri="{FF2B5EF4-FFF2-40B4-BE49-F238E27FC236}">
-                <a16:creationId xmlns:a16="http://schemas.microsoft.com/office/drawing/2014/main" id="{C22672AD-286D-3B4D-8E2F-0ECA4E90C60E}"/>
+                <a16:creationId xmlns:a16="http://schemas.microsoft.com/office/drawing/2014/main" id="{8F5030D4-362E-7B40-93DC-35E66361608C}"/>
               </a:ext>
             </a:extLst>
           </p:cNvPr>
@@ -7186,465 +7185,100 @@
         </p:nvSpPr>
         <p:spPr>
           <a:xfrm>
-            <a:off x="1032933" y="4534958"/>
-            <a:ext cx="10127192" cy="931340"/>
-          </a:xfrm>
-        </p:spPr>
-        <p:txBody>
-          <a:bodyPr vert="horz" lIns="91440" tIns="45720" rIns="91440" bIns="45720" rtlCol="0" anchor="b">
-            <a:normAutofit/>
-          </a:bodyPr>
-          <a:lstStyle/>
-          <a:p>
-            <a:pPr algn="r"/>
+            <a:off x="1030287" y="95250"/>
+            <a:ext cx="10131425" cy="1456267"/>
+          </a:xfrm>
+        </p:spPr>
+        <p:txBody>
+          <a:bodyPr/>
+          <a:lstStyle/>
+          <a:p>
+            <a:pPr algn="ctr"/>
             <a:r>
               <a:rPr lang="en-US" sz="4000" dirty="0"/>
-              <a:t>Cancer – census data (tawny)</a:t>
-            </a:r>
-          </a:p>
-        </p:txBody>
-      </p:sp>
-      <p:sp>
-        <p:nvSpPr>
-          <p:cNvPr id="3" name="Content Placeholder 2">
+              <a:t>Cancer – obesity </a:t>
+            </a:r>
+            <a:r>
+              <a:rPr lang="en-US" sz="2800" dirty="0"/>
+              <a:t>(Valerie)</a:t>
+            </a:r>
+          </a:p>
+        </p:txBody>
+      </p:sp>
+      <p:pic>
+        <p:nvPicPr>
+          <p:cNvPr id="5" name="Content Placeholder 4" descr="A close up of a map&#10;&#10;Description automatically generated">
             <a:extLst>
               <a:ext uri="{FF2B5EF4-FFF2-40B4-BE49-F238E27FC236}">
-                <a16:creationId xmlns:a16="http://schemas.microsoft.com/office/drawing/2014/main" id="{A32A483F-5485-E84B-8E8D-4070B28DE0AA}"/>
+                <a16:creationId xmlns:a16="http://schemas.microsoft.com/office/drawing/2014/main" id="{BF651B1C-7390-6E4D-B9F0-A6AA1B074C06}"/>
               </a:ext>
             </a:extLst>
           </p:cNvPr>
-          <p:cNvSpPr>
-            <a:spLocks noGrp="1"/>
-          </p:cNvSpPr>
+          <p:cNvPicPr>
+            <a:picLocks noGrp="1" noChangeAspect="1"/>
+          </p:cNvPicPr>
           <p:nvPr>
             <p:ph idx="1"/>
           </p:nvPr>
-        </p:nvSpPr>
-        <p:spPr>
-          <a:xfrm>
-            <a:off x="2788920" y="5469474"/>
-            <a:ext cx="8371205" cy="397926"/>
-          </a:xfrm>
-        </p:spPr>
-        <p:txBody>
-          <a:bodyPr vert="horz" lIns="91440" tIns="45720" rIns="91440" bIns="45720" rtlCol="0" anchor="t">
-            <a:normAutofit/>
-          </a:bodyPr>
-          <a:lstStyle/>
-          <a:p>
-            <a:pPr marL="0" indent="0" algn="r">
-              <a:lnSpc>
-                <a:spcPct val="90000"/>
-              </a:lnSpc>
-              <a:buNone/>
-            </a:pPr>
-            <a:r>
-              <a:rPr lang="en-US" sz="1200" cap="all" dirty="0"/>
-              <a:t>By County - The WEAKEST correlation between deaths* and census data was median AGE</a:t>
-            </a:r>
-          </a:p>
-        </p:txBody>
-      </p:sp>
-      <p:grpSp>
-        <p:nvGrpSpPr>
-          <p:cNvPr id="5" name="Group 4">
+        </p:nvPicPr>
+        <p:blipFill>
+          <a:blip r:embed="rId2"/>
+          <a:stretch>
+            <a:fillRect/>
+          </a:stretch>
+        </p:blipFill>
+        <p:spPr>
+          <a:xfrm>
+            <a:off x="2819475" y="1551517"/>
+            <a:ext cx="6553047" cy="4368698"/>
+          </a:xfrm>
+        </p:spPr>
+      </p:pic>
+      <p:sp>
+        <p:nvSpPr>
+          <p:cNvPr id="3" name="TextBox 2">
             <a:extLst>
               <a:ext uri="{FF2B5EF4-FFF2-40B4-BE49-F238E27FC236}">
-                <a16:creationId xmlns:a16="http://schemas.microsoft.com/office/drawing/2014/main" id="{2AF01347-EBAC-4045-A3DB-26F2A85B22AE}"/>
+                <a16:creationId xmlns:a16="http://schemas.microsoft.com/office/drawing/2014/main" id="{0A1E8D84-CF41-DB4C-BC7C-03021CD6273C}"/>
               </a:ext>
             </a:extLst>
           </p:cNvPr>
-          <p:cNvGrpSpPr/>
+          <p:cNvSpPr txBox="1"/>
           <p:nvPr/>
-        </p:nvGrpSpPr>
-        <p:grpSpPr>
-          <a:xfrm>
-            <a:off x="6512113" y="198632"/>
-            <a:ext cx="4541821" cy="4193157"/>
-            <a:chOff x="6512113" y="198632"/>
-            <a:chExt cx="4541821" cy="4193157"/>
-          </a:xfrm>
-        </p:grpSpPr>
-        <p:pic>
-          <p:nvPicPr>
-            <p:cNvPr id="1026" name="Picture 2">
-              <a:extLst>
-                <a:ext uri="{FF2B5EF4-FFF2-40B4-BE49-F238E27FC236}">
-                  <a16:creationId xmlns:a16="http://schemas.microsoft.com/office/drawing/2014/main" id="{6426ABC8-1864-44B6-9AC6-0A7E31053EC4}"/>
-                </a:ext>
-              </a:extLst>
-            </p:cNvPr>
-            <p:cNvPicPr>
-              <a:picLocks noChangeAspect="1" noChangeArrowheads="1"/>
-            </p:cNvPicPr>
-            <p:nvPr/>
-          </p:nvPicPr>
-          <p:blipFill>
-            <a:blip r:embed="rId2"/>
-            <a:srcRect/>
-            <a:stretch/>
-          </p:blipFill>
-          <p:spPr bwMode="auto">
-            <a:xfrm>
-              <a:off x="6550582" y="682241"/>
-              <a:ext cx="4457442" cy="3709548"/>
-            </a:xfrm>
-            <a:prstGeom prst="roundRect">
-              <a:avLst>
-                <a:gd name="adj" fmla="val 4380"/>
-              </a:avLst>
-            </a:prstGeom>
-            <a:solidFill>
-              <a:srgbClr val="FFFFFF">
-                <a:shade val="85000"/>
-              </a:srgbClr>
-            </a:solidFill>
-            <a:ln w="50800" cap="sq" cmpd="dbl">
-              <a:gradFill flip="none" rotWithShape="1">
-                <a:gsLst>
-                  <a:gs pos="0">
-                    <a:srgbClr val="FFFFFF"/>
-                  </a:gs>
-                  <a:gs pos="100000">
-                    <a:schemeClr val="tx1">
-                      <a:alpha val="0"/>
-                    </a:schemeClr>
-                  </a:gs>
-                </a:gsLst>
-                <a:path path="circle">
-                  <a:fillToRect l="50000" t="50000" r="50000" b="50000"/>
-                </a:path>
-                <a:tileRect/>
-              </a:gradFill>
-              <a:miter lim="800000"/>
-            </a:ln>
-            <a:effectLst>
-              <a:outerShdw blurRad="254000" algn="tl" rotWithShape="0">
-                <a:srgbClr val="000000">
-                  <a:alpha val="43000"/>
-                </a:srgbClr>
-              </a:outerShdw>
-            </a:effectLst>
-            <a:scene3d>
-              <a:camera prst="orthographicFront"/>
-              <a:lightRig rig="twoPt" dir="t">
-                <a:rot lat="0" lon="0" rev="7200000"/>
-              </a:lightRig>
-            </a:scene3d>
-            <a:sp3d>
-              <a:bevelT w="25400" h="19050"/>
-              <a:contourClr>
-                <a:srgbClr val="FFFFFF"/>
-              </a:contourClr>
-            </a:sp3d>
-          </p:spPr>
-        </p:pic>
-        <p:sp>
-          <p:nvSpPr>
-            <p:cNvPr id="13" name="TextBox 12">
-              <a:extLst>
-                <a:ext uri="{FF2B5EF4-FFF2-40B4-BE49-F238E27FC236}">
-                  <a16:creationId xmlns:a16="http://schemas.microsoft.com/office/drawing/2014/main" id="{B1D0A302-9402-4187-B5F5-58284C24A134}"/>
-                </a:ext>
-              </a:extLst>
-            </p:cNvPr>
-            <p:cNvSpPr txBox="1"/>
-            <p:nvPr/>
-          </p:nvSpPr>
-          <p:spPr>
-            <a:xfrm>
-              <a:off x="6512113" y="198632"/>
-              <a:ext cx="4541821" cy="307777"/>
-            </a:xfrm>
-            <a:prstGeom prst="rect">
-              <a:avLst/>
-            </a:prstGeom>
-            <a:noFill/>
-          </p:spPr>
-          <p:txBody>
-            <a:bodyPr wrap="none" rtlCol="0">
-              <a:spAutoFit/>
-            </a:bodyPr>
-            <a:lstStyle/>
-            <a:p>
-              <a:pPr>
-                <a:spcAft>
-                  <a:spcPts val="600"/>
-                </a:spcAft>
-              </a:pPr>
-              <a:r>
-                <a:rPr lang="en-US" sz="1400" dirty="0"/>
-                <a:t>The correlation between death rate and no insurance is 0.24</a:t>
-              </a:r>
-            </a:p>
-          </p:txBody>
-        </p:sp>
-      </p:grpSp>
-      <p:grpSp>
-        <p:nvGrpSpPr>
-          <p:cNvPr id="6" name="Group 5">
-            <a:extLst>
-              <a:ext uri="{FF2B5EF4-FFF2-40B4-BE49-F238E27FC236}">
-                <a16:creationId xmlns:a16="http://schemas.microsoft.com/office/drawing/2014/main" id="{7EFF70A7-8546-43C7-8ACD-84C575C59D9B}"/>
-              </a:ext>
-            </a:extLst>
-          </p:cNvPr>
-          <p:cNvGrpSpPr/>
-          <p:nvPr/>
-        </p:nvGrpSpPr>
-        <p:grpSpPr>
-          <a:xfrm>
-            <a:off x="1254317" y="182264"/>
-            <a:ext cx="4636397" cy="4179015"/>
-            <a:chOff x="1254317" y="182264"/>
-            <a:chExt cx="4636397" cy="4179015"/>
-          </a:xfrm>
-        </p:grpSpPr>
-        <p:pic>
-          <p:nvPicPr>
-            <p:cNvPr id="22" name="Picture 21">
-              <a:extLst>
-                <a:ext uri="{FF2B5EF4-FFF2-40B4-BE49-F238E27FC236}">
-                  <a16:creationId xmlns:a16="http://schemas.microsoft.com/office/drawing/2014/main" id="{6DD8BC8E-0603-451E-9253-83B674168D1D}"/>
-                </a:ext>
-              </a:extLst>
-            </p:cNvPr>
-            <p:cNvPicPr>
-              <a:picLocks noChangeAspect="1"/>
-            </p:cNvPicPr>
-            <p:nvPr/>
-          </p:nvPicPr>
-          <p:blipFill>
-            <a:blip r:embed="rId3"/>
-            <a:srcRect/>
-            <a:stretch/>
-          </p:blipFill>
-          <p:spPr>
-            <a:xfrm>
-              <a:off x="1290665" y="667920"/>
-              <a:ext cx="4348633" cy="3693359"/>
-            </a:xfrm>
-            <a:prstGeom prst="roundRect">
-              <a:avLst>
-                <a:gd name="adj" fmla="val 4380"/>
-              </a:avLst>
-            </a:prstGeom>
-            <a:solidFill>
-              <a:srgbClr val="FFFFFF">
-                <a:shade val="85000"/>
-              </a:srgbClr>
-            </a:solidFill>
-            <a:ln w="50800" cap="sq" cmpd="dbl">
-              <a:gradFill flip="none" rotWithShape="1">
-                <a:gsLst>
-                  <a:gs pos="0">
-                    <a:srgbClr val="FFFFFF"/>
-                  </a:gs>
-                  <a:gs pos="100000">
-                    <a:schemeClr val="tx1">
-                      <a:alpha val="0"/>
-                    </a:schemeClr>
-                  </a:gs>
-                </a:gsLst>
-                <a:path path="circle">
-                  <a:fillToRect l="50000" t="50000" r="50000" b="50000"/>
-                </a:path>
-                <a:tileRect/>
-              </a:gradFill>
-              <a:miter lim="800000"/>
-            </a:ln>
-            <a:effectLst>
-              <a:outerShdw blurRad="254000" algn="tl" rotWithShape="0">
-                <a:srgbClr val="000000">
-                  <a:alpha val="43000"/>
-                </a:srgbClr>
-              </a:outerShdw>
-            </a:effectLst>
-            <a:scene3d>
-              <a:camera prst="orthographicFront"/>
-              <a:lightRig rig="twoPt" dir="t">
-                <a:rot lat="0" lon="0" rev="7200000"/>
-              </a:lightRig>
-            </a:scene3d>
-            <a:sp3d>
-              <a:bevelT w="25400" h="19050"/>
-              <a:contourClr>
-                <a:srgbClr val="FFFFFF"/>
-              </a:contourClr>
-            </a:sp3d>
-          </p:spPr>
-        </p:pic>
-        <p:sp>
-          <p:nvSpPr>
-            <p:cNvPr id="20" name="TextBox 19">
-              <a:extLst>
-                <a:ext uri="{FF2B5EF4-FFF2-40B4-BE49-F238E27FC236}">
-                  <a16:creationId xmlns:a16="http://schemas.microsoft.com/office/drawing/2014/main" id="{23A95A4A-EABC-4A19-9800-BAF3B0631F19}"/>
-                </a:ext>
-              </a:extLst>
-            </p:cNvPr>
-            <p:cNvSpPr txBox="1"/>
-            <p:nvPr/>
-          </p:nvSpPr>
-          <p:spPr>
-            <a:xfrm>
-              <a:off x="1254317" y="182264"/>
-              <a:ext cx="4636397" cy="307777"/>
-            </a:xfrm>
-            <a:prstGeom prst="rect">
-              <a:avLst/>
-            </a:prstGeom>
-            <a:noFill/>
-          </p:spPr>
-          <p:txBody>
-            <a:bodyPr wrap="none" rtlCol="0">
-              <a:spAutoFit/>
-            </a:bodyPr>
-            <a:lstStyle/>
-            <a:p>
-              <a:pPr>
-                <a:spcAft>
-                  <a:spcPts val="600"/>
-                </a:spcAft>
-              </a:pPr>
-              <a:r>
-                <a:rPr lang="en-US" sz="1400" dirty="0"/>
-                <a:t>The correlation between death rate and no insurance is -0.05</a:t>
-              </a:r>
-            </a:p>
-          </p:txBody>
-        </p:sp>
-      </p:grpSp>
+        </p:nvSpPr>
+        <p:spPr>
+          <a:xfrm>
+            <a:off x="4582699" y="5920215"/>
+            <a:ext cx="2981714" cy="369332"/>
+          </a:xfrm>
+          <a:prstGeom prst="rect">
+            <a:avLst/>
+          </a:prstGeom>
+          <a:noFill/>
+        </p:spPr>
+        <p:txBody>
+          <a:bodyPr wrap="none" rtlCol="0">
+            <a:spAutoFit/>
+          </a:bodyPr>
+          <a:lstStyle/>
+          <a:p>
+            <a:r>
+              <a:rPr lang="en-US" dirty="0"/>
+              <a:t>r value: 0.8075564184676005</a:t>
+            </a:r>
+          </a:p>
+        </p:txBody>
+      </p:sp>
     </p:spTree>
     <p:extLst>
       <p:ext uri="{BB962C8B-B14F-4D97-AF65-F5344CB8AC3E}">
-        <p14:creationId xmlns:p14="http://schemas.microsoft.com/office/powerpoint/2010/main" val="3008555039"/>
+        <p14:creationId xmlns:p14="http://schemas.microsoft.com/office/powerpoint/2010/main" val="4138844305"/>
       </p:ext>
     </p:extLst>
   </p:cSld>
   <p:clrMapOvr>
     <a:masterClrMapping/>
   </p:clrMapOvr>
-  <p:timing>
-    <p:tnLst>
-      <p:par>
-        <p:cTn id="1" dur="indefinite" restart="never" nodeType="tmRoot">
-          <p:childTnLst>
-            <p:seq concurrent="1" nextAc="seek">
-              <p:cTn id="2" dur="indefinite" nodeType="mainSeq">
-                <p:childTnLst>
-                  <p:par>
-                    <p:cTn id="3" fill="hold">
-                      <p:stCondLst>
-                        <p:cond delay="indefinite"/>
-                      </p:stCondLst>
-                      <p:childTnLst>
-                        <p:par>
-                          <p:cTn id="4" fill="hold">
-                            <p:stCondLst>
-                              <p:cond delay="0"/>
-                            </p:stCondLst>
-                            <p:childTnLst>
-                              <p:par>
-                                <p:cTn id="5" presetID="1" presetClass="entr" presetSubtype="0" fill="hold" nodeType="clickEffect">
-                                  <p:stCondLst>
-                                    <p:cond delay="0"/>
-                                  </p:stCondLst>
-                                  <p:childTnLst>
-                                    <p:set>
-                                      <p:cBhvr>
-                                        <p:cTn id="6" dur="1" fill="hold">
-                                          <p:stCondLst>
-                                            <p:cond delay="0"/>
-                                          </p:stCondLst>
-                                        </p:cTn>
-                                        <p:tgtEl>
-                                          <p:spTgt spid="5"/>
-                                        </p:tgtEl>
-                                        <p:attrNameLst>
-                                          <p:attrName>style.visibility</p:attrName>
-                                        </p:attrNameLst>
-                                      </p:cBhvr>
-                                      <p:to>
-                                        <p:strVal val="visible"/>
-                                      </p:to>
-                                    </p:set>
-                                  </p:childTnLst>
-                                </p:cTn>
-                              </p:par>
-                            </p:childTnLst>
-                          </p:cTn>
-                        </p:par>
-                      </p:childTnLst>
-                    </p:cTn>
-                  </p:par>
-                  <p:par>
-                    <p:cTn id="7" fill="hold">
-                      <p:stCondLst>
-                        <p:cond delay="indefinite"/>
-                      </p:stCondLst>
-                      <p:childTnLst>
-                        <p:par>
-                          <p:cTn id="8" fill="hold">
-                            <p:stCondLst>
-                              <p:cond delay="0"/>
-                            </p:stCondLst>
-                            <p:childTnLst>
-                              <p:par>
-                                <p:cTn id="9" presetID="1" presetClass="entr" presetSubtype="0" fill="hold" nodeType="clickEffect">
-                                  <p:stCondLst>
-                                    <p:cond delay="0"/>
-                                  </p:stCondLst>
-                                  <p:childTnLst>
-                                    <p:set>
-                                      <p:cBhvr>
-                                        <p:cTn id="10" dur="1" fill="hold">
-                                          <p:stCondLst>
-                                            <p:cond delay="0"/>
-                                          </p:stCondLst>
-                                        </p:cTn>
-                                        <p:tgtEl>
-                                          <p:spTgt spid="6"/>
-                                        </p:tgtEl>
-                                        <p:attrNameLst>
-                                          <p:attrName>style.visibility</p:attrName>
-                                        </p:attrNameLst>
-                                      </p:cBhvr>
-                                      <p:to>
-                                        <p:strVal val="visible"/>
-                                      </p:to>
-                                    </p:set>
-                                  </p:childTnLst>
-                                </p:cTn>
-                              </p:par>
-                            </p:childTnLst>
-                          </p:cTn>
-                        </p:par>
-                      </p:childTnLst>
-                    </p:cTn>
-                  </p:par>
-                </p:childTnLst>
-              </p:cTn>
-              <p:prevCondLst>
-                <p:cond evt="onPrev" delay="0">
-                  <p:tgtEl>
-                    <p:sldTgt/>
-                  </p:tgtEl>
-                </p:cond>
-              </p:prevCondLst>
-              <p:nextCondLst>
-                <p:cond evt="onNext" delay="0">
-                  <p:tgtEl>
-                    <p:sldTgt/>
-                  </p:tgtEl>
-                </p:cond>
-              </p:nextCondLst>
-            </p:seq>
-          </p:childTnLst>
-        </p:cTn>
-      </p:par>
-    </p:tnLst>
-  </p:timing>
 </p:sld>
 </file>
 
@@ -7670,7 +7304,7 @@
           <p:cNvPr id="2" name="Title 1">
             <a:extLst>
               <a:ext uri="{FF2B5EF4-FFF2-40B4-BE49-F238E27FC236}">
-                <a16:creationId xmlns:a16="http://schemas.microsoft.com/office/drawing/2014/main" id="{8F5030D4-362E-7B40-93DC-35E66361608C}"/>
+                <a16:creationId xmlns:a16="http://schemas.microsoft.com/office/drawing/2014/main" id="{2442D1D8-4C6A-D546-910B-6B844438D973}"/>
               </a:ext>
             </a:extLst>
           </p:cNvPr>
@@ -7683,7 +7317,7 @@
         </p:nvSpPr>
         <p:spPr>
           <a:xfrm>
-            <a:off x="1030287" y="95250"/>
+            <a:off x="685800" y="146508"/>
             <a:ext cx="10131425" cy="1456267"/>
           </a:xfrm>
         </p:spPr>
@@ -7691,24 +7325,23 @@
           <a:bodyPr/>
           <a:lstStyle/>
           <a:p>
-            <a:pPr algn="ctr"/>
             <a:r>
               <a:rPr lang="en-US" sz="4000" dirty="0"/>
-              <a:t>Cancer – obesity </a:t>
+              <a:t>Cancer – smoking </a:t>
             </a:r>
             <a:r>
               <a:rPr lang="en-US" sz="2800" dirty="0"/>
-              <a:t>(Valerie)</a:t>
+              <a:t>(trevor)</a:t>
             </a:r>
           </a:p>
         </p:txBody>
       </p:sp>
       <p:pic>
         <p:nvPicPr>
-          <p:cNvPr id="5" name="Content Placeholder 4" descr="A close up of a map&#10;&#10;Description automatically generated">
+          <p:cNvPr id="4" name="Content Placeholder 3" descr="A screenshot of a cell phone&#10;&#10;Description automatically generated">
             <a:extLst>
               <a:ext uri="{FF2B5EF4-FFF2-40B4-BE49-F238E27FC236}">
-                <a16:creationId xmlns:a16="http://schemas.microsoft.com/office/drawing/2014/main" id="{BF651B1C-7390-6E4D-B9F0-A6AA1B074C06}"/>
+                <a16:creationId xmlns:a16="http://schemas.microsoft.com/office/drawing/2014/main" id="{A1A8A288-4026-7F45-9FC1-003E183CF64A}"/>
               </a:ext>
             </a:extLst>
           </p:cNvPr>
@@ -7727,50 +7360,18 @@
         </p:blipFill>
         <p:spPr>
           <a:xfrm>
-            <a:off x="2819475" y="1551517"/>
-            <a:ext cx="6553047" cy="4368698"/>
-          </a:xfrm>
-        </p:spPr>
-      </p:pic>
-      <p:sp>
-        <p:nvSpPr>
-          <p:cNvPr id="3" name="TextBox 2">
-            <a:extLst>
-              <a:ext uri="{FF2B5EF4-FFF2-40B4-BE49-F238E27FC236}">
-                <a16:creationId xmlns:a16="http://schemas.microsoft.com/office/drawing/2014/main" id="{0A1E8D84-CF41-DB4C-BC7C-03021CD6273C}"/>
-              </a:ext>
-            </a:extLst>
-          </p:cNvPr>
-          <p:cNvSpPr txBox="1"/>
-          <p:nvPr/>
-        </p:nvSpPr>
-        <p:spPr>
-          <a:xfrm>
-            <a:off x="4582699" y="5920215"/>
-            <a:ext cx="2981714" cy="369332"/>
+            <a:off x="2563882" y="1567430"/>
+            <a:ext cx="6375262" cy="4157514"/>
           </a:xfrm>
           <a:prstGeom prst="rect">
             <a:avLst/>
           </a:prstGeom>
-          <a:noFill/>
-        </p:spPr>
-        <p:txBody>
-          <a:bodyPr wrap="none" rtlCol="0">
-            <a:spAutoFit/>
-          </a:bodyPr>
-          <a:lstStyle/>
-          <a:p>
-            <a:r>
-              <a:rPr lang="en-US" dirty="0"/>
-              <a:t>r value: 0.8075564184676005</a:t>
-            </a:r>
-          </a:p>
-        </p:txBody>
-      </p:sp>
+        </p:spPr>
+      </p:pic>
     </p:spTree>
     <p:extLst>
       <p:ext uri="{BB962C8B-B14F-4D97-AF65-F5344CB8AC3E}">
-        <p14:creationId xmlns:p14="http://schemas.microsoft.com/office/powerpoint/2010/main" val="4138844305"/>
+        <p14:creationId xmlns:p14="http://schemas.microsoft.com/office/powerpoint/2010/main" val="2846826042"/>
       </p:ext>
     </p:extLst>
   </p:cSld>
@@ -7802,7 +7403,7 @@
           <p:cNvPr id="2" name="Title 1">
             <a:extLst>
               <a:ext uri="{FF2B5EF4-FFF2-40B4-BE49-F238E27FC236}">
-                <a16:creationId xmlns:a16="http://schemas.microsoft.com/office/drawing/2014/main" id="{2442D1D8-4C6A-D546-910B-6B844438D973}"/>
+                <a16:creationId xmlns:a16="http://schemas.microsoft.com/office/drawing/2014/main" id="{ED19FC3C-6080-4D42-AD97-7BB1178554E7}"/>
               </a:ext>
             </a:extLst>
           </p:cNvPr>
@@ -7813,63 +7414,72 @@
             <p:ph type="title"/>
           </p:nvPr>
         </p:nvSpPr>
-        <p:spPr>
-          <a:xfrm>
-            <a:off x="685800" y="146508"/>
-            <a:ext cx="10131425" cy="1456267"/>
-          </a:xfrm>
-        </p:spPr>
-        <p:txBody>
-          <a:bodyPr/>
+        <p:spPr/>
+        <p:txBody>
+          <a:bodyPr>
+            <a:normAutofit/>
+          </a:bodyPr>
           <a:lstStyle/>
           <a:p>
             <a:r>
               <a:rPr lang="en-US" sz="4000" dirty="0"/>
-              <a:t>Cancer – smoking </a:t>
-            </a:r>
-            <a:r>
-              <a:rPr lang="en-US" sz="2800" dirty="0"/>
-              <a:t>(trevor)</a:t>
-            </a:r>
-          </a:p>
-        </p:txBody>
-      </p:sp>
-      <p:pic>
-        <p:nvPicPr>
-          <p:cNvPr id="4" name="Content Placeholder 3" descr="A screenshot of a cell phone&#10;&#10;Description automatically generated">
+              <a:t>Conclusions / Summary</a:t>
+            </a:r>
+          </a:p>
+        </p:txBody>
+      </p:sp>
+      <p:sp>
+        <p:nvSpPr>
+          <p:cNvPr id="3" name="Content Placeholder 2">
             <a:extLst>
               <a:ext uri="{FF2B5EF4-FFF2-40B4-BE49-F238E27FC236}">
-                <a16:creationId xmlns:a16="http://schemas.microsoft.com/office/drawing/2014/main" id="{A1A8A288-4026-7F45-9FC1-003E183CF64A}"/>
+                <a16:creationId xmlns:a16="http://schemas.microsoft.com/office/drawing/2014/main" id="{139100DE-8DD7-C247-90C3-CD4101963B83}"/>
               </a:ext>
             </a:extLst>
           </p:cNvPr>
-          <p:cNvPicPr>
-            <a:picLocks noGrp="1" noChangeAspect="1"/>
-          </p:cNvPicPr>
+          <p:cNvSpPr>
+            <a:spLocks noGrp="1"/>
+          </p:cNvSpPr>
           <p:nvPr>
             <p:ph idx="1"/>
           </p:nvPr>
-        </p:nvPicPr>
-        <p:blipFill>
-          <a:blip r:embed="rId2"/>
-          <a:stretch>
-            <a:fillRect/>
-          </a:stretch>
-        </p:blipFill>
-        <p:spPr>
-          <a:xfrm>
-            <a:off x="2563882" y="1567430"/>
-            <a:ext cx="6375262" cy="4157514"/>
-          </a:xfrm>
-          <a:prstGeom prst="rect">
-            <a:avLst/>
-          </a:prstGeom>
-        </p:spPr>
-      </p:pic>
+        </p:nvSpPr>
+        <p:spPr/>
+        <p:txBody>
+          <a:bodyPr>
+            <a:normAutofit/>
+          </a:bodyPr>
+          <a:lstStyle/>
+          <a:p>
+            <a:r>
+              <a:rPr lang="en-US" sz="2800" dirty="0"/>
+              <a:t>Lower prevalence of alcohol and smoking correlations to cancer than expected</a:t>
+            </a:r>
+          </a:p>
+          <a:p>
+            <a:r>
+              <a:rPr lang="en-US" sz="2800" dirty="0"/>
+              <a:t>Health insurance has no direct impact (Obamacare)</a:t>
+            </a:r>
+          </a:p>
+          <a:p>
+            <a:r>
+              <a:rPr lang="en-US" sz="2800" dirty="0"/>
+              <a:t>Higher correlation of obesity in cancer death rate across the nation</a:t>
+            </a:r>
+          </a:p>
+          <a:p>
+            <a:pPr marL="0" indent="0">
+              <a:buNone/>
+            </a:pPr>
+            <a:endParaRPr lang="en-US" sz="2800" dirty="0"/>
+          </a:p>
+        </p:txBody>
+      </p:sp>
     </p:spTree>
     <p:extLst>
       <p:ext uri="{BB962C8B-B14F-4D97-AF65-F5344CB8AC3E}">
-        <p14:creationId xmlns:p14="http://schemas.microsoft.com/office/powerpoint/2010/main" val="2846826042"/>
+        <p14:creationId xmlns:p14="http://schemas.microsoft.com/office/powerpoint/2010/main" val="56598581"/>
       </p:ext>
     </p:extLst>
   </p:cSld>
@@ -7901,114 +7511,6 @@
           <p:cNvPr id="2" name="Title 1">
             <a:extLst>
               <a:ext uri="{FF2B5EF4-FFF2-40B4-BE49-F238E27FC236}">
-                <a16:creationId xmlns:a16="http://schemas.microsoft.com/office/drawing/2014/main" id="{ED19FC3C-6080-4D42-AD97-7BB1178554E7}"/>
-              </a:ext>
-            </a:extLst>
-          </p:cNvPr>
-          <p:cNvSpPr>
-            <a:spLocks noGrp="1"/>
-          </p:cNvSpPr>
-          <p:nvPr>
-            <p:ph type="title"/>
-          </p:nvPr>
-        </p:nvSpPr>
-        <p:spPr/>
-        <p:txBody>
-          <a:bodyPr>
-            <a:normAutofit/>
-          </a:bodyPr>
-          <a:lstStyle/>
-          <a:p>
-            <a:r>
-              <a:rPr lang="en-US" sz="4000" dirty="0"/>
-              <a:t>Conclusions / Summary</a:t>
-            </a:r>
-          </a:p>
-        </p:txBody>
-      </p:sp>
-      <p:sp>
-        <p:nvSpPr>
-          <p:cNvPr id="3" name="Content Placeholder 2">
-            <a:extLst>
-              <a:ext uri="{FF2B5EF4-FFF2-40B4-BE49-F238E27FC236}">
-                <a16:creationId xmlns:a16="http://schemas.microsoft.com/office/drawing/2014/main" id="{139100DE-8DD7-C247-90C3-CD4101963B83}"/>
-              </a:ext>
-            </a:extLst>
-          </p:cNvPr>
-          <p:cNvSpPr>
-            <a:spLocks noGrp="1"/>
-          </p:cNvSpPr>
-          <p:nvPr>
-            <p:ph idx="1"/>
-          </p:nvPr>
-        </p:nvSpPr>
-        <p:spPr/>
-        <p:txBody>
-          <a:bodyPr>
-            <a:normAutofit/>
-          </a:bodyPr>
-          <a:lstStyle/>
-          <a:p>
-            <a:r>
-              <a:rPr lang="en-US" sz="2800" dirty="0"/>
-              <a:t>Lower prevalence of alcohol and smoking correlations to cancer than expected</a:t>
-            </a:r>
-          </a:p>
-          <a:p>
-            <a:r>
-              <a:rPr lang="en-US" sz="2800" dirty="0"/>
-              <a:t>Health insurance has no direct impact (Obamacare)</a:t>
-            </a:r>
-          </a:p>
-          <a:p>
-            <a:r>
-              <a:rPr lang="en-US" sz="2800" dirty="0"/>
-              <a:t>Higher correlation of obesity in cancer death rate across the nation</a:t>
-            </a:r>
-          </a:p>
-          <a:p>
-            <a:pPr marL="0" indent="0">
-              <a:buNone/>
-            </a:pPr>
-            <a:endParaRPr lang="en-US" sz="2800" dirty="0"/>
-          </a:p>
-        </p:txBody>
-      </p:sp>
-    </p:spTree>
-    <p:extLst>
-      <p:ext uri="{BB962C8B-B14F-4D97-AF65-F5344CB8AC3E}">
-        <p14:creationId xmlns:p14="http://schemas.microsoft.com/office/powerpoint/2010/main" val="56598581"/>
-      </p:ext>
-    </p:extLst>
-  </p:cSld>
-  <p:clrMapOvr>
-    <a:masterClrMapping/>
-  </p:clrMapOvr>
-</p:sld>
-</file>
-
-<file path=ppt/slides/slide15.xml><?xml version="1.0" encoding="utf-8"?>
-<p:sld xmlns:a="http://schemas.openxmlformats.org/drawingml/2006/main" xmlns:r="http://schemas.openxmlformats.org/officeDocument/2006/relationships" xmlns:p="http://schemas.openxmlformats.org/presentationml/2006/main">
-  <p:cSld>
-    <p:spTree>
-      <p:nvGrpSpPr>
-        <p:cNvPr id="1" name=""/>
-        <p:cNvGrpSpPr/>
-        <p:nvPr/>
-      </p:nvGrpSpPr>
-      <p:grpSpPr>
-        <a:xfrm>
-          <a:off x="0" y="0"/>
-          <a:ext cx="0" cy="0"/>
-          <a:chOff x="0" y="0"/>
-          <a:chExt cx="0" cy="0"/>
-        </a:xfrm>
-      </p:grpSpPr>
-      <p:sp>
-        <p:nvSpPr>
-          <p:cNvPr id="2" name="Title 1">
-            <a:extLst>
-              <a:ext uri="{FF2B5EF4-FFF2-40B4-BE49-F238E27FC236}">
                 <a16:creationId xmlns:a16="http://schemas.microsoft.com/office/drawing/2014/main" id="{01B34777-B502-F246-A2C1-C82C2A67E757}"/>
               </a:ext>
             </a:extLst>
@@ -8095,7 +7597,7 @@
 </p:sld>
 </file>
 
-<file path=ppt/slides/slide16.xml><?xml version="1.0" encoding="utf-8"?>
+<file path=ppt/slides/slide15.xml><?xml version="1.0" encoding="utf-8"?>
 <p:sld xmlns:a="http://schemas.openxmlformats.org/drawingml/2006/main" xmlns:r="http://schemas.openxmlformats.org/officeDocument/2006/relationships" xmlns:p="http://schemas.openxmlformats.org/presentationml/2006/main">
   <p:cSld>
     <p:spTree>

</xml_diff>